<commit_message>
fix : ppt ver2
</commit_message>
<xml_diff>
--- a/20/beom/DB_Index.pptx
+++ b/20/beom/DB_Index.pptx
@@ -5,16 +5,21 @@
     <p:sldMasterId id="2147483648" r:id="rId1"/>
   </p:sldMasterIdLst>
   <p:notesMasterIdLst>
-    <p:notesMasterId r:id="rId9"/>
+    <p:notesMasterId r:id="rId14"/>
   </p:notesMasterIdLst>
   <p:sldIdLst>
     <p:sldId id="257" r:id="rId2"/>
-    <p:sldId id="259" r:id="rId3"/>
-    <p:sldId id="295" r:id="rId4"/>
-    <p:sldId id="283" r:id="rId5"/>
-    <p:sldId id="293" r:id="rId6"/>
-    <p:sldId id="294" r:id="rId7"/>
-    <p:sldId id="285" r:id="rId8"/>
+    <p:sldId id="295" r:id="rId3"/>
+    <p:sldId id="283" r:id="rId4"/>
+    <p:sldId id="293" r:id="rId5"/>
+    <p:sldId id="294" r:id="rId6"/>
+    <p:sldId id="285" r:id="rId7"/>
+    <p:sldId id="296" r:id="rId8"/>
+    <p:sldId id="297" r:id="rId9"/>
+    <p:sldId id="298" r:id="rId10"/>
+    <p:sldId id="299" r:id="rId11"/>
+    <p:sldId id="300" r:id="rId12"/>
+    <p:sldId id="301" r:id="rId13"/>
   </p:sldIdLst>
   <p:sldSz cx="12192000" cy="6858000"/>
   <p:notesSz cx="6858000" cy="9144000"/>
@@ -203,7 +208,7 @@
           <a:p>
             <a:fld id="{584E9FA8-164B-485B-89B7-5F2E0A357284}" type="datetimeFigureOut">
               <a:rPr lang="ko-KR" altLang="en-US" smtClean="0"/>
-              <a:t>2022-05-18</a:t>
+              <a:t>2022-05-19</a:t>
             </a:fld>
             <a:endParaRPr lang="ko-KR" altLang="en-US"/>
           </a:p>
@@ -535,7 +540,7 @@
           <a:p>
             <a:fld id="{E50CC78D-D063-4E8A-91D5-C467BE26FA22}" type="slidenum">
               <a:rPr lang="ko-KR" altLang="en-US" smtClean="0"/>
-              <a:t>3</a:t>
+              <a:t>2</a:t>
             </a:fld>
             <a:endParaRPr lang="ko-KR" altLang="en-US"/>
           </a:p>
@@ -545,6 +550,174 @@
     <p:extLst>
       <p:ext uri="{BB962C8B-B14F-4D97-AF65-F5344CB8AC3E}">
         <p14:creationId xmlns:p14="http://schemas.microsoft.com/office/powerpoint/2010/main" val="798259391"/>
+      </p:ext>
+    </p:extLst>
+  </p:cSld>
+  <p:clrMapOvr>
+    <a:masterClrMapping/>
+  </p:clrMapOvr>
+</p:notes>
+</file>
+
+<file path=ppt/notesSlides/notesSlide10.xml><?xml version="1.0" encoding="utf-8"?>
+<p:notes xmlns:a="http://schemas.openxmlformats.org/drawingml/2006/main" xmlns:r="http://schemas.openxmlformats.org/officeDocument/2006/relationships" xmlns:p="http://schemas.openxmlformats.org/presentationml/2006/main">
+  <p:cSld>
+    <p:spTree>
+      <p:nvGrpSpPr>
+        <p:cNvPr id="1" name=""/>
+        <p:cNvGrpSpPr/>
+        <p:nvPr/>
+      </p:nvGrpSpPr>
+      <p:grpSpPr>
+        <a:xfrm>
+          <a:off x="0" y="0"/>
+          <a:ext cx="0" cy="0"/>
+          <a:chOff x="0" y="0"/>
+          <a:chExt cx="0" cy="0"/>
+        </a:xfrm>
+      </p:grpSpPr>
+      <p:sp>
+        <p:nvSpPr>
+          <p:cNvPr id="2" name="슬라이드 이미지 개체 틀 1"/>
+          <p:cNvSpPr>
+            <a:spLocks noGrp="1" noRot="1" noChangeAspect="1"/>
+          </p:cNvSpPr>
+          <p:nvPr>
+            <p:ph type="sldImg"/>
+          </p:nvPr>
+        </p:nvSpPr>
+        <p:spPr/>
+      </p:sp>
+      <p:sp>
+        <p:nvSpPr>
+          <p:cNvPr id="3" name="슬라이드 노트 개체 틀 2"/>
+          <p:cNvSpPr>
+            <a:spLocks noGrp="1"/>
+          </p:cNvSpPr>
+          <p:nvPr>
+            <p:ph type="body" idx="1"/>
+          </p:nvPr>
+        </p:nvSpPr>
+        <p:spPr/>
+        <p:txBody>
+          <a:bodyPr/>
+          <a:lstStyle/>
+          <a:p>
+            <a:endParaRPr lang="ko-KR" altLang="en-US" dirty="0"/>
+          </a:p>
+        </p:txBody>
+      </p:sp>
+      <p:sp>
+        <p:nvSpPr>
+          <p:cNvPr id="4" name="슬라이드 번호 개체 틀 3"/>
+          <p:cNvSpPr>
+            <a:spLocks noGrp="1"/>
+          </p:cNvSpPr>
+          <p:nvPr>
+            <p:ph type="sldNum" sz="quarter" idx="5"/>
+          </p:nvPr>
+        </p:nvSpPr>
+        <p:spPr/>
+        <p:txBody>
+          <a:bodyPr/>
+          <a:lstStyle/>
+          <a:p>
+            <a:fld id="{E50CC78D-D063-4E8A-91D5-C467BE26FA22}" type="slidenum">
+              <a:rPr lang="ko-KR" altLang="en-US" smtClean="0"/>
+              <a:t>11</a:t>
+            </a:fld>
+            <a:endParaRPr lang="ko-KR" altLang="en-US"/>
+          </a:p>
+        </p:txBody>
+      </p:sp>
+    </p:spTree>
+    <p:extLst>
+      <p:ext uri="{BB962C8B-B14F-4D97-AF65-F5344CB8AC3E}">
+        <p14:creationId xmlns:p14="http://schemas.microsoft.com/office/powerpoint/2010/main" val="4081104890"/>
+      </p:ext>
+    </p:extLst>
+  </p:cSld>
+  <p:clrMapOvr>
+    <a:masterClrMapping/>
+  </p:clrMapOvr>
+</p:notes>
+</file>
+
+<file path=ppt/notesSlides/notesSlide11.xml><?xml version="1.0" encoding="utf-8"?>
+<p:notes xmlns:a="http://schemas.openxmlformats.org/drawingml/2006/main" xmlns:r="http://schemas.openxmlformats.org/officeDocument/2006/relationships" xmlns:p="http://schemas.openxmlformats.org/presentationml/2006/main">
+  <p:cSld>
+    <p:spTree>
+      <p:nvGrpSpPr>
+        <p:cNvPr id="1" name=""/>
+        <p:cNvGrpSpPr/>
+        <p:nvPr/>
+      </p:nvGrpSpPr>
+      <p:grpSpPr>
+        <a:xfrm>
+          <a:off x="0" y="0"/>
+          <a:ext cx="0" cy="0"/>
+          <a:chOff x="0" y="0"/>
+          <a:chExt cx="0" cy="0"/>
+        </a:xfrm>
+      </p:grpSpPr>
+      <p:sp>
+        <p:nvSpPr>
+          <p:cNvPr id="2" name="슬라이드 이미지 개체 틀 1"/>
+          <p:cNvSpPr>
+            <a:spLocks noGrp="1" noRot="1" noChangeAspect="1"/>
+          </p:cNvSpPr>
+          <p:nvPr>
+            <p:ph type="sldImg"/>
+          </p:nvPr>
+        </p:nvSpPr>
+        <p:spPr/>
+      </p:sp>
+      <p:sp>
+        <p:nvSpPr>
+          <p:cNvPr id="3" name="슬라이드 노트 개체 틀 2"/>
+          <p:cNvSpPr>
+            <a:spLocks noGrp="1"/>
+          </p:cNvSpPr>
+          <p:nvPr>
+            <p:ph type="body" idx="1"/>
+          </p:nvPr>
+        </p:nvSpPr>
+        <p:spPr/>
+        <p:txBody>
+          <a:bodyPr/>
+          <a:lstStyle/>
+          <a:p>
+            <a:endParaRPr lang="ko-KR" altLang="en-US" dirty="0"/>
+          </a:p>
+        </p:txBody>
+      </p:sp>
+      <p:sp>
+        <p:nvSpPr>
+          <p:cNvPr id="4" name="슬라이드 번호 개체 틀 3"/>
+          <p:cNvSpPr>
+            <a:spLocks noGrp="1"/>
+          </p:cNvSpPr>
+          <p:nvPr>
+            <p:ph type="sldNum" sz="quarter" idx="5"/>
+          </p:nvPr>
+        </p:nvSpPr>
+        <p:spPr/>
+        <p:txBody>
+          <a:bodyPr/>
+          <a:lstStyle/>
+          <a:p>
+            <a:fld id="{E50CC78D-D063-4E8A-91D5-C467BE26FA22}" type="slidenum">
+              <a:rPr lang="ko-KR" altLang="en-US" smtClean="0"/>
+              <a:t>12</a:t>
+            </a:fld>
+            <a:endParaRPr lang="ko-KR" altLang="en-US"/>
+          </a:p>
+        </p:txBody>
+      </p:sp>
+    </p:spTree>
+    <p:extLst>
+      <p:ext uri="{BB962C8B-B14F-4D97-AF65-F5344CB8AC3E}">
+        <p14:creationId xmlns:p14="http://schemas.microsoft.com/office/powerpoint/2010/main" val="2946055792"/>
       </p:ext>
     </p:extLst>
   </p:cSld>
@@ -619,7 +792,7 @@
           <a:p>
             <a:fld id="{E50CC78D-D063-4E8A-91D5-C467BE26FA22}" type="slidenum">
               <a:rPr lang="ko-KR" altLang="en-US" smtClean="0"/>
-              <a:t>4</a:t>
+              <a:t>3</a:t>
             </a:fld>
             <a:endParaRPr lang="ko-KR" altLang="en-US"/>
           </a:p>
@@ -703,7 +876,7 @@
           <a:p>
             <a:fld id="{E50CC78D-D063-4E8A-91D5-C467BE26FA22}" type="slidenum">
               <a:rPr lang="ko-KR" altLang="en-US" smtClean="0"/>
-              <a:t>5</a:t>
+              <a:t>4</a:t>
             </a:fld>
             <a:endParaRPr lang="ko-KR" altLang="en-US"/>
           </a:p>
@@ -787,7 +960,7 @@
           <a:p>
             <a:fld id="{E50CC78D-D063-4E8A-91D5-C467BE26FA22}" type="slidenum">
               <a:rPr lang="ko-KR" altLang="en-US" smtClean="0"/>
-              <a:t>6</a:t>
+              <a:t>5</a:t>
             </a:fld>
             <a:endParaRPr lang="ko-KR" altLang="en-US"/>
           </a:p>
@@ -871,7 +1044,7 @@
           <a:p>
             <a:fld id="{E50CC78D-D063-4E8A-91D5-C467BE26FA22}" type="slidenum">
               <a:rPr lang="ko-KR" altLang="en-US" smtClean="0"/>
-              <a:t>7</a:t>
+              <a:t>6</a:t>
             </a:fld>
             <a:endParaRPr lang="ko-KR" altLang="en-US"/>
           </a:p>
@@ -881,6 +1054,342 @@
     <p:extLst>
       <p:ext uri="{BB962C8B-B14F-4D97-AF65-F5344CB8AC3E}">
         <p14:creationId xmlns:p14="http://schemas.microsoft.com/office/powerpoint/2010/main" val="2362787164"/>
+      </p:ext>
+    </p:extLst>
+  </p:cSld>
+  <p:clrMapOvr>
+    <a:masterClrMapping/>
+  </p:clrMapOvr>
+</p:notes>
+</file>
+
+<file path=ppt/notesSlides/notesSlide6.xml><?xml version="1.0" encoding="utf-8"?>
+<p:notes xmlns:a="http://schemas.openxmlformats.org/drawingml/2006/main" xmlns:r="http://schemas.openxmlformats.org/officeDocument/2006/relationships" xmlns:p="http://schemas.openxmlformats.org/presentationml/2006/main">
+  <p:cSld>
+    <p:spTree>
+      <p:nvGrpSpPr>
+        <p:cNvPr id="1" name=""/>
+        <p:cNvGrpSpPr/>
+        <p:nvPr/>
+      </p:nvGrpSpPr>
+      <p:grpSpPr>
+        <a:xfrm>
+          <a:off x="0" y="0"/>
+          <a:ext cx="0" cy="0"/>
+          <a:chOff x="0" y="0"/>
+          <a:chExt cx="0" cy="0"/>
+        </a:xfrm>
+      </p:grpSpPr>
+      <p:sp>
+        <p:nvSpPr>
+          <p:cNvPr id="2" name="슬라이드 이미지 개체 틀 1"/>
+          <p:cNvSpPr>
+            <a:spLocks noGrp="1" noRot="1" noChangeAspect="1"/>
+          </p:cNvSpPr>
+          <p:nvPr>
+            <p:ph type="sldImg"/>
+          </p:nvPr>
+        </p:nvSpPr>
+        <p:spPr/>
+      </p:sp>
+      <p:sp>
+        <p:nvSpPr>
+          <p:cNvPr id="3" name="슬라이드 노트 개체 틀 2"/>
+          <p:cNvSpPr>
+            <a:spLocks noGrp="1"/>
+          </p:cNvSpPr>
+          <p:nvPr>
+            <p:ph type="body" idx="1"/>
+          </p:nvPr>
+        </p:nvSpPr>
+        <p:spPr/>
+        <p:txBody>
+          <a:bodyPr/>
+          <a:lstStyle/>
+          <a:p>
+            <a:endParaRPr lang="ko-KR" altLang="en-US" dirty="0"/>
+          </a:p>
+        </p:txBody>
+      </p:sp>
+      <p:sp>
+        <p:nvSpPr>
+          <p:cNvPr id="4" name="슬라이드 번호 개체 틀 3"/>
+          <p:cNvSpPr>
+            <a:spLocks noGrp="1"/>
+          </p:cNvSpPr>
+          <p:nvPr>
+            <p:ph type="sldNum" sz="quarter" idx="5"/>
+          </p:nvPr>
+        </p:nvSpPr>
+        <p:spPr/>
+        <p:txBody>
+          <a:bodyPr/>
+          <a:lstStyle/>
+          <a:p>
+            <a:fld id="{E50CC78D-D063-4E8A-91D5-C467BE26FA22}" type="slidenum">
+              <a:rPr lang="ko-KR" altLang="en-US" smtClean="0"/>
+              <a:t>7</a:t>
+            </a:fld>
+            <a:endParaRPr lang="ko-KR" altLang="en-US"/>
+          </a:p>
+        </p:txBody>
+      </p:sp>
+    </p:spTree>
+    <p:extLst>
+      <p:ext uri="{BB962C8B-B14F-4D97-AF65-F5344CB8AC3E}">
+        <p14:creationId xmlns:p14="http://schemas.microsoft.com/office/powerpoint/2010/main" val="1831519554"/>
+      </p:ext>
+    </p:extLst>
+  </p:cSld>
+  <p:clrMapOvr>
+    <a:masterClrMapping/>
+  </p:clrMapOvr>
+</p:notes>
+</file>
+
+<file path=ppt/notesSlides/notesSlide7.xml><?xml version="1.0" encoding="utf-8"?>
+<p:notes xmlns:a="http://schemas.openxmlformats.org/drawingml/2006/main" xmlns:r="http://schemas.openxmlformats.org/officeDocument/2006/relationships" xmlns:p="http://schemas.openxmlformats.org/presentationml/2006/main">
+  <p:cSld>
+    <p:spTree>
+      <p:nvGrpSpPr>
+        <p:cNvPr id="1" name=""/>
+        <p:cNvGrpSpPr/>
+        <p:nvPr/>
+      </p:nvGrpSpPr>
+      <p:grpSpPr>
+        <a:xfrm>
+          <a:off x="0" y="0"/>
+          <a:ext cx="0" cy="0"/>
+          <a:chOff x="0" y="0"/>
+          <a:chExt cx="0" cy="0"/>
+        </a:xfrm>
+      </p:grpSpPr>
+      <p:sp>
+        <p:nvSpPr>
+          <p:cNvPr id="2" name="슬라이드 이미지 개체 틀 1"/>
+          <p:cNvSpPr>
+            <a:spLocks noGrp="1" noRot="1" noChangeAspect="1"/>
+          </p:cNvSpPr>
+          <p:nvPr>
+            <p:ph type="sldImg"/>
+          </p:nvPr>
+        </p:nvSpPr>
+        <p:spPr/>
+      </p:sp>
+      <p:sp>
+        <p:nvSpPr>
+          <p:cNvPr id="3" name="슬라이드 노트 개체 틀 2"/>
+          <p:cNvSpPr>
+            <a:spLocks noGrp="1"/>
+          </p:cNvSpPr>
+          <p:nvPr>
+            <p:ph type="body" idx="1"/>
+          </p:nvPr>
+        </p:nvSpPr>
+        <p:spPr/>
+        <p:txBody>
+          <a:bodyPr/>
+          <a:lstStyle/>
+          <a:p>
+            <a:endParaRPr lang="ko-KR" altLang="en-US" dirty="0"/>
+          </a:p>
+        </p:txBody>
+      </p:sp>
+      <p:sp>
+        <p:nvSpPr>
+          <p:cNvPr id="4" name="슬라이드 번호 개체 틀 3"/>
+          <p:cNvSpPr>
+            <a:spLocks noGrp="1"/>
+          </p:cNvSpPr>
+          <p:nvPr>
+            <p:ph type="sldNum" sz="quarter" idx="5"/>
+          </p:nvPr>
+        </p:nvSpPr>
+        <p:spPr/>
+        <p:txBody>
+          <a:bodyPr/>
+          <a:lstStyle/>
+          <a:p>
+            <a:fld id="{E50CC78D-D063-4E8A-91D5-C467BE26FA22}" type="slidenum">
+              <a:rPr lang="ko-KR" altLang="en-US" smtClean="0"/>
+              <a:t>8</a:t>
+            </a:fld>
+            <a:endParaRPr lang="ko-KR" altLang="en-US"/>
+          </a:p>
+        </p:txBody>
+      </p:sp>
+    </p:spTree>
+    <p:extLst>
+      <p:ext uri="{BB962C8B-B14F-4D97-AF65-F5344CB8AC3E}">
+        <p14:creationId xmlns:p14="http://schemas.microsoft.com/office/powerpoint/2010/main" val="2945574771"/>
+      </p:ext>
+    </p:extLst>
+  </p:cSld>
+  <p:clrMapOvr>
+    <a:masterClrMapping/>
+  </p:clrMapOvr>
+</p:notes>
+</file>
+
+<file path=ppt/notesSlides/notesSlide8.xml><?xml version="1.0" encoding="utf-8"?>
+<p:notes xmlns:a="http://schemas.openxmlformats.org/drawingml/2006/main" xmlns:r="http://schemas.openxmlformats.org/officeDocument/2006/relationships" xmlns:p="http://schemas.openxmlformats.org/presentationml/2006/main">
+  <p:cSld>
+    <p:spTree>
+      <p:nvGrpSpPr>
+        <p:cNvPr id="1" name=""/>
+        <p:cNvGrpSpPr/>
+        <p:nvPr/>
+      </p:nvGrpSpPr>
+      <p:grpSpPr>
+        <a:xfrm>
+          <a:off x="0" y="0"/>
+          <a:ext cx="0" cy="0"/>
+          <a:chOff x="0" y="0"/>
+          <a:chExt cx="0" cy="0"/>
+        </a:xfrm>
+      </p:grpSpPr>
+      <p:sp>
+        <p:nvSpPr>
+          <p:cNvPr id="2" name="슬라이드 이미지 개체 틀 1"/>
+          <p:cNvSpPr>
+            <a:spLocks noGrp="1" noRot="1" noChangeAspect="1"/>
+          </p:cNvSpPr>
+          <p:nvPr>
+            <p:ph type="sldImg"/>
+          </p:nvPr>
+        </p:nvSpPr>
+        <p:spPr/>
+      </p:sp>
+      <p:sp>
+        <p:nvSpPr>
+          <p:cNvPr id="3" name="슬라이드 노트 개체 틀 2"/>
+          <p:cNvSpPr>
+            <a:spLocks noGrp="1"/>
+          </p:cNvSpPr>
+          <p:nvPr>
+            <p:ph type="body" idx="1"/>
+          </p:nvPr>
+        </p:nvSpPr>
+        <p:spPr/>
+        <p:txBody>
+          <a:bodyPr/>
+          <a:lstStyle/>
+          <a:p>
+            <a:endParaRPr lang="ko-KR" altLang="en-US" dirty="0"/>
+          </a:p>
+        </p:txBody>
+      </p:sp>
+      <p:sp>
+        <p:nvSpPr>
+          <p:cNvPr id="4" name="슬라이드 번호 개체 틀 3"/>
+          <p:cNvSpPr>
+            <a:spLocks noGrp="1"/>
+          </p:cNvSpPr>
+          <p:nvPr>
+            <p:ph type="sldNum" sz="quarter" idx="5"/>
+          </p:nvPr>
+        </p:nvSpPr>
+        <p:spPr/>
+        <p:txBody>
+          <a:bodyPr/>
+          <a:lstStyle/>
+          <a:p>
+            <a:fld id="{E50CC78D-D063-4E8A-91D5-C467BE26FA22}" type="slidenum">
+              <a:rPr lang="ko-KR" altLang="en-US" smtClean="0"/>
+              <a:t>9</a:t>
+            </a:fld>
+            <a:endParaRPr lang="ko-KR" altLang="en-US"/>
+          </a:p>
+        </p:txBody>
+      </p:sp>
+    </p:spTree>
+    <p:extLst>
+      <p:ext uri="{BB962C8B-B14F-4D97-AF65-F5344CB8AC3E}">
+        <p14:creationId xmlns:p14="http://schemas.microsoft.com/office/powerpoint/2010/main" val="97379050"/>
+      </p:ext>
+    </p:extLst>
+  </p:cSld>
+  <p:clrMapOvr>
+    <a:masterClrMapping/>
+  </p:clrMapOvr>
+</p:notes>
+</file>
+
+<file path=ppt/notesSlides/notesSlide9.xml><?xml version="1.0" encoding="utf-8"?>
+<p:notes xmlns:a="http://schemas.openxmlformats.org/drawingml/2006/main" xmlns:r="http://schemas.openxmlformats.org/officeDocument/2006/relationships" xmlns:p="http://schemas.openxmlformats.org/presentationml/2006/main">
+  <p:cSld>
+    <p:spTree>
+      <p:nvGrpSpPr>
+        <p:cNvPr id="1" name=""/>
+        <p:cNvGrpSpPr/>
+        <p:nvPr/>
+      </p:nvGrpSpPr>
+      <p:grpSpPr>
+        <a:xfrm>
+          <a:off x="0" y="0"/>
+          <a:ext cx="0" cy="0"/>
+          <a:chOff x="0" y="0"/>
+          <a:chExt cx="0" cy="0"/>
+        </a:xfrm>
+      </p:grpSpPr>
+      <p:sp>
+        <p:nvSpPr>
+          <p:cNvPr id="2" name="슬라이드 이미지 개체 틀 1"/>
+          <p:cNvSpPr>
+            <a:spLocks noGrp="1" noRot="1" noChangeAspect="1"/>
+          </p:cNvSpPr>
+          <p:nvPr>
+            <p:ph type="sldImg"/>
+          </p:nvPr>
+        </p:nvSpPr>
+        <p:spPr/>
+      </p:sp>
+      <p:sp>
+        <p:nvSpPr>
+          <p:cNvPr id="3" name="슬라이드 노트 개체 틀 2"/>
+          <p:cNvSpPr>
+            <a:spLocks noGrp="1"/>
+          </p:cNvSpPr>
+          <p:nvPr>
+            <p:ph type="body" idx="1"/>
+          </p:nvPr>
+        </p:nvSpPr>
+        <p:spPr/>
+        <p:txBody>
+          <a:bodyPr/>
+          <a:lstStyle/>
+          <a:p>
+            <a:endParaRPr lang="ko-KR" altLang="en-US" dirty="0"/>
+          </a:p>
+        </p:txBody>
+      </p:sp>
+      <p:sp>
+        <p:nvSpPr>
+          <p:cNvPr id="4" name="슬라이드 번호 개체 틀 3"/>
+          <p:cNvSpPr>
+            <a:spLocks noGrp="1"/>
+          </p:cNvSpPr>
+          <p:nvPr>
+            <p:ph type="sldNum" sz="quarter" idx="5"/>
+          </p:nvPr>
+        </p:nvSpPr>
+        <p:spPr/>
+        <p:txBody>
+          <a:bodyPr/>
+          <a:lstStyle/>
+          <a:p>
+            <a:fld id="{E50CC78D-D063-4E8A-91D5-C467BE26FA22}" type="slidenum">
+              <a:rPr lang="ko-KR" altLang="en-US" smtClean="0"/>
+              <a:t>10</a:t>
+            </a:fld>
+            <a:endParaRPr lang="ko-KR" altLang="en-US"/>
+          </a:p>
+        </p:txBody>
+      </p:sp>
+    </p:spTree>
+    <p:extLst>
+      <p:ext uri="{BB962C8B-B14F-4D97-AF65-F5344CB8AC3E}">
+        <p14:creationId xmlns:p14="http://schemas.microsoft.com/office/powerpoint/2010/main" val="2929759215"/>
       </p:ext>
     </p:extLst>
   </p:cSld>
@@ -1037,7 +1546,7 @@
           <a:p>
             <a:fld id="{35E87A9C-3629-4C00-B345-D33EEDCBC4E7}" type="datetimeFigureOut">
               <a:rPr lang="ko-KR" altLang="en-US" smtClean="0"/>
-              <a:t>2022-05-18</a:t>
+              <a:t>2022-05-19</a:t>
             </a:fld>
             <a:endParaRPr lang="ko-KR" altLang="en-US"/>
           </a:p>
@@ -1235,7 +1744,7 @@
           <a:p>
             <a:fld id="{35E87A9C-3629-4C00-B345-D33EEDCBC4E7}" type="datetimeFigureOut">
               <a:rPr lang="ko-KR" altLang="en-US" smtClean="0"/>
-              <a:t>2022-05-18</a:t>
+              <a:t>2022-05-19</a:t>
             </a:fld>
             <a:endParaRPr lang="ko-KR" altLang="en-US"/>
           </a:p>
@@ -1443,7 +1952,7 @@
           <a:p>
             <a:fld id="{35E87A9C-3629-4C00-B345-D33EEDCBC4E7}" type="datetimeFigureOut">
               <a:rPr lang="ko-KR" altLang="en-US" smtClean="0"/>
-              <a:t>2022-05-18</a:t>
+              <a:t>2022-05-19</a:t>
             </a:fld>
             <a:endParaRPr lang="ko-KR" altLang="en-US"/>
           </a:p>
@@ -1641,7 +2150,7 @@
           <a:p>
             <a:fld id="{35E87A9C-3629-4C00-B345-D33EEDCBC4E7}" type="datetimeFigureOut">
               <a:rPr lang="ko-KR" altLang="en-US" smtClean="0"/>
-              <a:t>2022-05-18</a:t>
+              <a:t>2022-05-19</a:t>
             </a:fld>
             <a:endParaRPr lang="ko-KR" altLang="en-US"/>
           </a:p>
@@ -1916,7 +2425,7 @@
           <a:p>
             <a:fld id="{35E87A9C-3629-4C00-B345-D33EEDCBC4E7}" type="datetimeFigureOut">
               <a:rPr lang="ko-KR" altLang="en-US" smtClean="0"/>
-              <a:t>2022-05-18</a:t>
+              <a:t>2022-05-19</a:t>
             </a:fld>
             <a:endParaRPr lang="ko-KR" altLang="en-US"/>
           </a:p>
@@ -2181,7 +2690,7 @@
           <a:p>
             <a:fld id="{35E87A9C-3629-4C00-B345-D33EEDCBC4E7}" type="datetimeFigureOut">
               <a:rPr lang="ko-KR" altLang="en-US" smtClean="0"/>
-              <a:t>2022-05-18</a:t>
+              <a:t>2022-05-19</a:t>
             </a:fld>
             <a:endParaRPr lang="ko-KR" altLang="en-US"/>
           </a:p>
@@ -2593,7 +3102,7 @@
           <a:p>
             <a:fld id="{35E87A9C-3629-4C00-B345-D33EEDCBC4E7}" type="datetimeFigureOut">
               <a:rPr lang="ko-KR" altLang="en-US" smtClean="0"/>
-              <a:t>2022-05-18</a:t>
+              <a:t>2022-05-19</a:t>
             </a:fld>
             <a:endParaRPr lang="ko-KR" altLang="en-US"/>
           </a:p>
@@ -2734,7 +3243,7 @@
           <a:p>
             <a:fld id="{35E87A9C-3629-4C00-B345-D33EEDCBC4E7}" type="datetimeFigureOut">
               <a:rPr lang="ko-KR" altLang="en-US" smtClean="0"/>
-              <a:t>2022-05-18</a:t>
+              <a:t>2022-05-19</a:t>
             </a:fld>
             <a:endParaRPr lang="ko-KR" altLang="en-US"/>
           </a:p>
@@ -2847,7 +3356,7 @@
           <a:p>
             <a:fld id="{35E87A9C-3629-4C00-B345-D33EEDCBC4E7}" type="datetimeFigureOut">
               <a:rPr lang="ko-KR" altLang="en-US" smtClean="0"/>
-              <a:t>2022-05-18</a:t>
+              <a:t>2022-05-19</a:t>
             </a:fld>
             <a:endParaRPr lang="ko-KR" altLang="en-US"/>
           </a:p>
@@ -3158,7 +3667,7 @@
           <a:p>
             <a:fld id="{35E87A9C-3629-4C00-B345-D33EEDCBC4E7}" type="datetimeFigureOut">
               <a:rPr lang="ko-KR" altLang="en-US" smtClean="0"/>
-              <a:t>2022-05-18</a:t>
+              <a:t>2022-05-19</a:t>
             </a:fld>
             <a:endParaRPr lang="ko-KR" altLang="en-US"/>
           </a:p>
@@ -3446,7 +3955,7 @@
           <a:p>
             <a:fld id="{35E87A9C-3629-4C00-B345-D33EEDCBC4E7}" type="datetimeFigureOut">
               <a:rPr lang="ko-KR" altLang="en-US" smtClean="0"/>
-              <a:t>2022-05-18</a:t>
+              <a:t>2022-05-19</a:t>
             </a:fld>
             <a:endParaRPr lang="ko-KR" altLang="en-US"/>
           </a:p>
@@ -3687,7 +4196,7 @@
           <a:p>
             <a:fld id="{35E87A9C-3629-4C00-B345-D33EEDCBC4E7}" type="datetimeFigureOut">
               <a:rPr lang="ko-KR" altLang="en-US" smtClean="0"/>
-              <a:t>2022-05-18</a:t>
+              <a:t>2022-05-19</a:t>
             </a:fld>
             <a:endParaRPr lang="ko-KR" altLang="en-US"/>
           </a:p>
@@ -4187,6 +4696,1110 @@
 </p:sld>
 </file>
 
+<file path=ppt/slides/slide10.xml><?xml version="1.0" encoding="utf-8"?>
+<p:sld xmlns:a="http://schemas.openxmlformats.org/drawingml/2006/main" xmlns:r="http://schemas.openxmlformats.org/officeDocument/2006/relationships" xmlns:p="http://schemas.openxmlformats.org/presentationml/2006/main">
+  <p:cSld>
+    <p:spTree>
+      <p:nvGrpSpPr>
+        <p:cNvPr id="1" name=""/>
+        <p:cNvGrpSpPr/>
+        <p:nvPr/>
+      </p:nvGrpSpPr>
+      <p:grpSpPr>
+        <a:xfrm>
+          <a:off x="0" y="0"/>
+          <a:ext cx="0" cy="0"/>
+          <a:chOff x="0" y="0"/>
+          <a:chExt cx="0" cy="0"/>
+        </a:xfrm>
+      </p:grpSpPr>
+      <p:sp>
+        <p:nvSpPr>
+          <p:cNvPr id="2" name="제목 1">
+            <a:extLst>
+              <a:ext uri="{FF2B5EF4-FFF2-40B4-BE49-F238E27FC236}">
+                <a16:creationId xmlns:a16="http://schemas.microsoft.com/office/drawing/2014/main" id="{12F6E3D9-C2B7-45CF-A682-4F90C0445652}"/>
+              </a:ext>
+            </a:extLst>
+          </p:cNvPr>
+          <p:cNvSpPr>
+            <a:spLocks noGrp="1"/>
+          </p:cNvSpPr>
+          <p:nvPr>
+            <p:ph type="title"/>
+          </p:nvPr>
+        </p:nvSpPr>
+        <p:spPr>
+          <a:xfrm>
+            <a:off x="838200" y="120305"/>
+            <a:ext cx="10515600" cy="1325563"/>
+          </a:xfrm>
+        </p:spPr>
+        <p:txBody>
+          <a:bodyPr/>
+          <a:lstStyle/>
+          <a:p>
+            <a:pPr algn="ctr"/>
+            <a:r>
+              <a:rPr lang="ko-KR" altLang="en-US" dirty="0"/>
+              <a:t>인덱스의 자료구조 </a:t>
+            </a:r>
+            <a:r>
+              <a:rPr lang="en-US" altLang="ko-KR" dirty="0"/>
+              <a:t>– Hash Table</a:t>
+            </a:r>
+            <a:endParaRPr lang="ko-KR" altLang="en-US" dirty="0"/>
+          </a:p>
+        </p:txBody>
+      </p:sp>
+      <p:sp>
+        <p:nvSpPr>
+          <p:cNvPr id="6" name="TextBox 5">
+            <a:extLst>
+              <a:ext uri="{FF2B5EF4-FFF2-40B4-BE49-F238E27FC236}">
+                <a16:creationId xmlns:a16="http://schemas.microsoft.com/office/drawing/2014/main" id="{E63C7871-199A-F648-5815-B4943840D64A}"/>
+              </a:ext>
+            </a:extLst>
+          </p:cNvPr>
+          <p:cNvSpPr txBox="1"/>
+          <p:nvPr/>
+        </p:nvSpPr>
+        <p:spPr>
+          <a:xfrm>
+            <a:off x="4329953" y="2049503"/>
+            <a:ext cx="7862047" cy="4401205"/>
+          </a:xfrm>
+          <a:prstGeom prst="rect">
+            <a:avLst/>
+          </a:prstGeom>
+          <a:noFill/>
+        </p:spPr>
+        <p:txBody>
+          <a:bodyPr wrap="square" rtlCol="0">
+            <a:spAutoFit/>
+          </a:bodyPr>
+          <a:lstStyle/>
+          <a:p>
+            <a:pPr marL="457200" indent="-457200">
+              <a:buFont typeface="Arial" panose="020B0604020202020204" pitchFamily="34" charset="0"/>
+              <a:buChar char="•"/>
+            </a:pPr>
+            <a:r>
+              <a:rPr lang="ko-KR" altLang="en-US" sz="2800" dirty="0"/>
+              <a:t>장점</a:t>
+            </a:r>
+            <a:endParaRPr lang="en-US" altLang="ko-KR" sz="2800" dirty="0"/>
+          </a:p>
+          <a:p>
+            <a:pPr marL="914400" lvl="1" indent="-457200">
+              <a:buFont typeface="Arial" panose="020B0604020202020204" pitchFamily="34" charset="0"/>
+              <a:buChar char="•"/>
+            </a:pPr>
+            <a:r>
+              <a:rPr lang="ko-KR" altLang="en-US" sz="2800" dirty="0"/>
+              <a:t>조회의 </a:t>
+            </a:r>
+            <a:r>
+              <a:rPr lang="ko-KR" altLang="en-US" sz="2800" dirty="0" err="1"/>
+              <a:t>시간복잡도</a:t>
+            </a:r>
+            <a:r>
+              <a:rPr lang="ko-KR" altLang="en-US" sz="2800" dirty="0"/>
+              <a:t> </a:t>
+            </a:r>
+            <a:r>
+              <a:rPr lang="en-US" altLang="ko-KR" sz="2800" dirty="0"/>
+              <a:t>: O(1)</a:t>
+            </a:r>
+          </a:p>
+          <a:p>
+            <a:pPr marL="914400" lvl="1" indent="-457200">
+              <a:buFont typeface="Arial" panose="020B0604020202020204" pitchFamily="34" charset="0"/>
+              <a:buChar char="•"/>
+            </a:pPr>
+            <a:r>
+              <a:rPr lang="ko-KR" altLang="en-US" sz="2800" dirty="0"/>
+              <a:t>해시 계산 비용이 데이터양의 의존</a:t>
+            </a:r>
+            <a:r>
+              <a:rPr lang="en-US" altLang="ko-KR" sz="2800" dirty="0"/>
+              <a:t>x</a:t>
+            </a:r>
+          </a:p>
+          <a:p>
+            <a:pPr lvl="1"/>
+            <a:endParaRPr lang="en-US" altLang="ko-KR" sz="2800" dirty="0"/>
+          </a:p>
+          <a:p>
+            <a:pPr marL="457200" indent="-457200">
+              <a:buFont typeface="Arial" panose="020B0604020202020204" pitchFamily="34" charset="0"/>
+              <a:buChar char="•"/>
+            </a:pPr>
+            <a:r>
+              <a:rPr lang="ko-KR" altLang="en-US" sz="2800" dirty="0"/>
+              <a:t>단점</a:t>
+            </a:r>
+            <a:endParaRPr lang="en-US" altLang="ko-KR" sz="2800" dirty="0"/>
+          </a:p>
+          <a:p>
+            <a:pPr marL="914400" lvl="1" indent="-457200">
+              <a:buFont typeface="Arial" panose="020B0604020202020204" pitchFamily="34" charset="0"/>
+              <a:buChar char="•"/>
+            </a:pPr>
+            <a:r>
+              <a:rPr lang="ko-KR" altLang="en-US" sz="2800" dirty="0"/>
+              <a:t>데이터의 양이 늘어날수록 평균 처리속도 증가</a:t>
+            </a:r>
+            <a:endParaRPr lang="en-US" altLang="ko-KR" sz="2800" dirty="0"/>
+          </a:p>
+          <a:p>
+            <a:pPr marL="914400" lvl="1" indent="-457200">
+              <a:buFont typeface="Arial" panose="020B0604020202020204" pitchFamily="34" charset="0"/>
+              <a:buChar char="•"/>
+            </a:pPr>
+            <a:r>
+              <a:rPr lang="en-US" altLang="ko-KR" sz="2800" dirty="0"/>
+              <a:t>= </a:t>
+            </a:r>
+            <a:r>
+              <a:rPr lang="ko-KR" altLang="en-US" sz="2800" dirty="0"/>
+              <a:t>연산에는 빠르나 </a:t>
+            </a:r>
+            <a:r>
+              <a:rPr lang="en-US" altLang="ko-KR" sz="2800" dirty="0"/>
+              <a:t>&gt;, &lt;</a:t>
+            </a:r>
+            <a:r>
+              <a:rPr lang="ko-KR" altLang="en-US" sz="2800" dirty="0"/>
+              <a:t>연산은 옳지 않다</a:t>
+            </a:r>
+            <a:r>
+              <a:rPr lang="en-US" altLang="ko-KR" sz="2800" dirty="0"/>
+              <a:t>.</a:t>
+            </a:r>
+          </a:p>
+          <a:p>
+            <a:pPr marL="914400" lvl="1" indent="-457200">
+              <a:buFont typeface="Arial" panose="020B0604020202020204" pitchFamily="34" charset="0"/>
+              <a:buChar char="•"/>
+            </a:pPr>
+            <a:endParaRPr lang="en-US" altLang="ko-KR" sz="2800" dirty="0"/>
+          </a:p>
+          <a:p>
+            <a:pPr marL="914400" lvl="1" indent="-457200">
+              <a:buFont typeface="Arial" panose="020B0604020202020204" pitchFamily="34" charset="0"/>
+              <a:buChar char="•"/>
+            </a:pPr>
+            <a:endParaRPr lang="en-US" altLang="ko-KR" sz="2800" dirty="0"/>
+          </a:p>
+        </p:txBody>
+      </p:sp>
+      <p:pic>
+        <p:nvPicPr>
+          <p:cNvPr id="4" name="그림 3">
+            <a:extLst>
+              <a:ext uri="{FF2B5EF4-FFF2-40B4-BE49-F238E27FC236}">
+                <a16:creationId xmlns:a16="http://schemas.microsoft.com/office/drawing/2014/main" id="{6555891C-79C8-07A4-91F8-9D3CB85592B0}"/>
+              </a:ext>
+            </a:extLst>
+          </p:cNvPr>
+          <p:cNvPicPr>
+            <a:picLocks noChangeAspect="1"/>
+          </p:cNvPicPr>
+          <p:nvPr/>
+        </p:nvPicPr>
+        <p:blipFill>
+          <a:blip r:embed="rId3"/>
+          <a:stretch>
+            <a:fillRect/>
+          </a:stretch>
+        </p:blipFill>
+        <p:spPr>
+          <a:xfrm>
+            <a:off x="0" y="2060175"/>
+            <a:ext cx="4434456" cy="2934757"/>
+          </a:xfrm>
+          <a:prstGeom prst="rect">
+            <a:avLst/>
+          </a:prstGeom>
+        </p:spPr>
+      </p:pic>
+    </p:spTree>
+    <p:extLst>
+      <p:ext uri="{BB962C8B-B14F-4D97-AF65-F5344CB8AC3E}">
+        <p14:creationId xmlns:p14="http://schemas.microsoft.com/office/powerpoint/2010/main" val="2367314444"/>
+      </p:ext>
+    </p:extLst>
+  </p:cSld>
+  <p:clrMapOvr>
+    <a:masterClrMapping/>
+  </p:clrMapOvr>
+</p:sld>
+</file>
+
+<file path=ppt/slides/slide11.xml><?xml version="1.0" encoding="utf-8"?>
+<p:sld xmlns:a="http://schemas.openxmlformats.org/drawingml/2006/main" xmlns:r="http://schemas.openxmlformats.org/officeDocument/2006/relationships" xmlns:p="http://schemas.openxmlformats.org/presentationml/2006/main">
+  <p:cSld>
+    <p:bg>
+      <p:bgPr>
+        <a:solidFill>
+          <a:schemeClr val="bg1"/>
+        </a:solidFill>
+        <a:effectLst/>
+      </p:bgPr>
+    </p:bg>
+    <p:spTree>
+      <p:nvGrpSpPr>
+        <p:cNvPr id="1" name=""/>
+        <p:cNvGrpSpPr/>
+        <p:nvPr/>
+      </p:nvGrpSpPr>
+      <p:grpSpPr>
+        <a:xfrm>
+          <a:off x="0" y="0"/>
+          <a:ext cx="0" cy="0"/>
+          <a:chOff x="0" y="0"/>
+          <a:chExt cx="0" cy="0"/>
+        </a:xfrm>
+      </p:grpSpPr>
+      <p:sp useBgFill="1">
+        <p:nvSpPr>
+          <p:cNvPr id="11" name="Rectangle 10">
+            <a:extLst>
+              <a:ext uri="{FF2B5EF4-FFF2-40B4-BE49-F238E27FC236}">
+                <a16:creationId xmlns:a16="http://schemas.microsoft.com/office/drawing/2014/main" id="{2B97F24A-32CE-4C1C-A50D-3016B394DCFB}"/>
+              </a:ext>
+              <a:ext uri="{C183D7F6-B498-43B3-948B-1728B52AA6E4}">
+                <adec:decorative xmlns:adec="http://schemas.microsoft.com/office/drawing/2017/decorative" val="1"/>
+              </a:ext>
+            </a:extLst>
+          </p:cNvPr>
+          <p:cNvSpPr>
+            <a:spLocks noGrp="1" noRot="1" noChangeAspect="1" noMove="1" noResize="1" noEditPoints="1" noAdjustHandles="1" noChangeArrowheads="1" noChangeShapeType="1" noTextEdit="1"/>
+          </p:cNvSpPr>
+          <p:nvPr>
+            <p:extLst>
+              <p:ext uri="{386F3935-93C4-4BCD-93E2-E3B085C9AB24}">
+                <p16:designElem xmlns:p16="http://schemas.microsoft.com/office/powerpoint/2015/main" val="1"/>
+              </p:ext>
+            </p:extLst>
+          </p:nvPr>
+        </p:nvSpPr>
+        <p:spPr>
+          <a:xfrm>
+            <a:off x="0" y="0"/>
+            <a:ext cx="12192000" cy="6858000"/>
+          </a:xfrm>
+          <a:prstGeom prst="rect">
+            <a:avLst/>
+          </a:prstGeom>
+          <a:ln>
+            <a:noFill/>
+          </a:ln>
+        </p:spPr>
+        <p:style>
+          <a:lnRef idx="2">
+            <a:schemeClr val="accent1">
+              <a:shade val="50000"/>
+            </a:schemeClr>
+          </a:lnRef>
+          <a:fillRef idx="1">
+            <a:schemeClr val="accent1"/>
+          </a:fillRef>
+          <a:effectRef idx="0">
+            <a:schemeClr val="accent1"/>
+          </a:effectRef>
+          <a:fontRef idx="minor">
+            <a:schemeClr val="lt1"/>
+          </a:fontRef>
+        </p:style>
+        <p:txBody>
+          <a:bodyPr rtlCol="0" anchor="ctr"/>
+          <a:lstStyle/>
+          <a:p>
+            <a:pPr algn="ctr"/>
+            <a:endParaRPr lang="en-US"/>
+          </a:p>
+        </p:txBody>
+      </p:sp>
+      <p:sp>
+        <p:nvSpPr>
+          <p:cNvPr id="2" name="제목 1">
+            <a:extLst>
+              <a:ext uri="{FF2B5EF4-FFF2-40B4-BE49-F238E27FC236}">
+                <a16:creationId xmlns:a16="http://schemas.microsoft.com/office/drawing/2014/main" id="{12F6E3D9-C2B7-45CF-A682-4F90C0445652}"/>
+              </a:ext>
+            </a:extLst>
+          </p:cNvPr>
+          <p:cNvSpPr>
+            <a:spLocks noGrp="1"/>
+          </p:cNvSpPr>
+          <p:nvPr>
+            <p:ph type="title"/>
+          </p:nvPr>
+        </p:nvSpPr>
+        <p:spPr>
+          <a:xfrm>
+            <a:off x="630936" y="639520"/>
+            <a:ext cx="3429000" cy="1719072"/>
+          </a:xfrm>
+        </p:spPr>
+        <p:txBody>
+          <a:bodyPr vert="horz" lIns="91440" tIns="45720" rIns="91440" bIns="45720" rtlCol="0" anchor="b">
+            <a:normAutofit/>
+          </a:bodyPr>
+          <a:lstStyle/>
+          <a:p>
+            <a:pPr latinLnBrk="0"/>
+            <a:r>
+              <a:rPr lang="ko-KR" altLang="en-US" sz="3800" kern="1200">
+                <a:solidFill>
+                  <a:schemeClr val="tx1"/>
+                </a:solidFill>
+                <a:latin typeface="+mj-lt"/>
+                <a:ea typeface="+mj-ea"/>
+                <a:cs typeface="+mj-cs"/>
+              </a:rPr>
+              <a:t>인덱스의 자료구조 </a:t>
+            </a:r>
+            <a:r>
+              <a:rPr lang="en-US" altLang="ko-KR" sz="3800" kern="1200">
+                <a:solidFill>
+                  <a:schemeClr val="tx1"/>
+                </a:solidFill>
+                <a:latin typeface="+mj-lt"/>
+                <a:ea typeface="+mj-ea"/>
+                <a:cs typeface="+mj-cs"/>
+              </a:rPr>
+              <a:t>– B+Tree</a:t>
+            </a:r>
+          </a:p>
+        </p:txBody>
+      </p:sp>
+      <p:sp>
+        <p:nvSpPr>
+          <p:cNvPr id="13" name="sketch line">
+            <a:extLst>
+              <a:ext uri="{FF2B5EF4-FFF2-40B4-BE49-F238E27FC236}">
+                <a16:creationId xmlns:a16="http://schemas.microsoft.com/office/drawing/2014/main" id="{CD8B4F24-440B-49E9-B85D-733523DC064B}"/>
+              </a:ext>
+              <a:ext uri="{C183D7F6-B498-43B3-948B-1728B52AA6E4}">
+                <adec:decorative xmlns:adec="http://schemas.microsoft.com/office/drawing/2017/decorative" val="1"/>
+              </a:ext>
+            </a:extLst>
+          </p:cNvPr>
+          <p:cNvSpPr>
+            <a:spLocks noGrp="1" noRot="1" noChangeAspect="1" noMove="1" noResize="1" noEditPoints="1" noAdjustHandles="1" noChangeArrowheads="1" noChangeShapeType="1" noTextEdit="1"/>
+          </p:cNvSpPr>
+          <p:nvPr>
+            <p:extLst>
+              <p:ext uri="{386F3935-93C4-4BCD-93E2-E3B085C9AB24}">
+                <p16:designElem xmlns:p16="http://schemas.microsoft.com/office/powerpoint/2015/main" val="1"/>
+              </p:ext>
+            </p:extLst>
+          </p:nvPr>
+        </p:nvSpPr>
+        <p:spPr>
+          <a:xfrm>
+            <a:off x="643278" y="2573756"/>
+            <a:ext cx="3255095" cy="18288"/>
+          </a:xfrm>
+          <a:custGeom>
+            <a:avLst/>
+            <a:gdLst>
+              <a:gd name="connsiteX0" fmla="*/ 0 w 3255095"/>
+              <a:gd name="connsiteY0" fmla="*/ 0 h 18288"/>
+              <a:gd name="connsiteX1" fmla="*/ 618468 w 3255095"/>
+              <a:gd name="connsiteY1" fmla="*/ 0 h 18288"/>
+              <a:gd name="connsiteX2" fmla="*/ 1269487 w 3255095"/>
+              <a:gd name="connsiteY2" fmla="*/ 0 h 18288"/>
+              <a:gd name="connsiteX3" fmla="*/ 1953057 w 3255095"/>
+              <a:gd name="connsiteY3" fmla="*/ 0 h 18288"/>
+              <a:gd name="connsiteX4" fmla="*/ 2636627 w 3255095"/>
+              <a:gd name="connsiteY4" fmla="*/ 0 h 18288"/>
+              <a:gd name="connsiteX5" fmla="*/ 3255095 w 3255095"/>
+              <a:gd name="connsiteY5" fmla="*/ 0 h 18288"/>
+              <a:gd name="connsiteX6" fmla="*/ 3255095 w 3255095"/>
+              <a:gd name="connsiteY6" fmla="*/ 18288 h 18288"/>
+              <a:gd name="connsiteX7" fmla="*/ 2538974 w 3255095"/>
+              <a:gd name="connsiteY7" fmla="*/ 18288 h 18288"/>
+              <a:gd name="connsiteX8" fmla="*/ 1822853 w 3255095"/>
+              <a:gd name="connsiteY8" fmla="*/ 18288 h 18288"/>
+              <a:gd name="connsiteX9" fmla="*/ 1171834 w 3255095"/>
+              <a:gd name="connsiteY9" fmla="*/ 18288 h 18288"/>
+              <a:gd name="connsiteX10" fmla="*/ 0 w 3255095"/>
+              <a:gd name="connsiteY10" fmla="*/ 18288 h 18288"/>
+              <a:gd name="connsiteX11" fmla="*/ 0 w 3255095"/>
+              <a:gd name="connsiteY11" fmla="*/ 0 h 18288"/>
+            </a:gdLst>
+            <a:ahLst/>
+            <a:cxnLst>
+              <a:cxn ang="0">
+                <a:pos x="connsiteX0" y="connsiteY0"/>
+              </a:cxn>
+              <a:cxn ang="0">
+                <a:pos x="connsiteX1" y="connsiteY1"/>
+              </a:cxn>
+              <a:cxn ang="0">
+                <a:pos x="connsiteX2" y="connsiteY2"/>
+              </a:cxn>
+              <a:cxn ang="0">
+                <a:pos x="connsiteX3" y="connsiteY3"/>
+              </a:cxn>
+              <a:cxn ang="0">
+                <a:pos x="connsiteX4" y="connsiteY4"/>
+              </a:cxn>
+              <a:cxn ang="0">
+                <a:pos x="connsiteX5" y="connsiteY5"/>
+              </a:cxn>
+              <a:cxn ang="0">
+                <a:pos x="connsiteX6" y="connsiteY6"/>
+              </a:cxn>
+              <a:cxn ang="0">
+                <a:pos x="connsiteX7" y="connsiteY7"/>
+              </a:cxn>
+              <a:cxn ang="0">
+                <a:pos x="connsiteX8" y="connsiteY8"/>
+              </a:cxn>
+              <a:cxn ang="0">
+                <a:pos x="connsiteX9" y="connsiteY9"/>
+              </a:cxn>
+              <a:cxn ang="0">
+                <a:pos x="connsiteX10" y="connsiteY10"/>
+              </a:cxn>
+              <a:cxn ang="0">
+                <a:pos x="connsiteX11" y="connsiteY11"/>
+              </a:cxn>
+            </a:cxnLst>
+            <a:rect l="l" t="t" r="r" b="b"/>
+            <a:pathLst>
+              <a:path w="3255095" h="18288" fill="none" extrusionOk="0">
+                <a:moveTo>
+                  <a:pt x="0" y="0"/>
+                </a:moveTo>
+                <a:cubicBezTo>
+                  <a:pt x="240201" y="-22123"/>
+                  <a:pt x="462021" y="-19623"/>
+                  <a:pt x="618468" y="0"/>
+                </a:cubicBezTo>
+                <a:cubicBezTo>
+                  <a:pt x="774915" y="19623"/>
+                  <a:pt x="974734" y="2035"/>
+                  <a:pt x="1269487" y="0"/>
+                </a:cubicBezTo>
+                <a:cubicBezTo>
+                  <a:pt x="1564240" y="-2035"/>
+                  <a:pt x="1733579" y="10639"/>
+                  <a:pt x="1953057" y="0"/>
+                </a:cubicBezTo>
+                <a:cubicBezTo>
+                  <a:pt x="2172535" y="-10639"/>
+                  <a:pt x="2453962" y="14018"/>
+                  <a:pt x="2636627" y="0"/>
+                </a:cubicBezTo>
+                <a:cubicBezTo>
+                  <a:pt x="2819292" y="-14018"/>
+                  <a:pt x="3121375" y="5399"/>
+                  <a:pt x="3255095" y="0"/>
+                </a:cubicBezTo>
+                <a:cubicBezTo>
+                  <a:pt x="3254386" y="8157"/>
+                  <a:pt x="3254682" y="12125"/>
+                  <a:pt x="3255095" y="18288"/>
+                </a:cubicBezTo>
+                <a:cubicBezTo>
+                  <a:pt x="3088545" y="23203"/>
+                  <a:pt x="2687475" y="7419"/>
+                  <a:pt x="2538974" y="18288"/>
+                </a:cubicBezTo>
+                <a:cubicBezTo>
+                  <a:pt x="2390473" y="29157"/>
+                  <a:pt x="2137381" y="-8959"/>
+                  <a:pt x="1822853" y="18288"/>
+                </a:cubicBezTo>
+                <a:cubicBezTo>
+                  <a:pt x="1508325" y="45535"/>
+                  <a:pt x="1466437" y="20385"/>
+                  <a:pt x="1171834" y="18288"/>
+                </a:cubicBezTo>
+                <a:cubicBezTo>
+                  <a:pt x="877231" y="16191"/>
+                  <a:pt x="561097" y="37643"/>
+                  <a:pt x="0" y="18288"/>
+                </a:cubicBezTo>
+                <a:cubicBezTo>
+                  <a:pt x="-46" y="12483"/>
+                  <a:pt x="-203" y="6491"/>
+                  <a:pt x="0" y="0"/>
+                </a:cubicBezTo>
+                <a:close/>
+              </a:path>
+              <a:path w="3255095" h="18288" stroke="0" extrusionOk="0">
+                <a:moveTo>
+                  <a:pt x="0" y="0"/>
+                </a:moveTo>
+                <a:cubicBezTo>
+                  <a:pt x="291965" y="19429"/>
+                  <a:pt x="363155" y="8568"/>
+                  <a:pt x="618468" y="0"/>
+                </a:cubicBezTo>
+                <a:cubicBezTo>
+                  <a:pt x="873781" y="-8568"/>
+                  <a:pt x="904459" y="-19505"/>
+                  <a:pt x="1171834" y="0"/>
+                </a:cubicBezTo>
+                <a:cubicBezTo>
+                  <a:pt x="1439209" y="19505"/>
+                  <a:pt x="1744369" y="9790"/>
+                  <a:pt x="1887955" y="0"/>
+                </a:cubicBezTo>
+                <a:cubicBezTo>
+                  <a:pt x="2031541" y="-9790"/>
+                  <a:pt x="2346378" y="21240"/>
+                  <a:pt x="2506423" y="0"/>
+                </a:cubicBezTo>
+                <a:cubicBezTo>
+                  <a:pt x="2666468" y="-21240"/>
+                  <a:pt x="2990257" y="30414"/>
+                  <a:pt x="3255095" y="0"/>
+                </a:cubicBezTo>
+                <a:cubicBezTo>
+                  <a:pt x="3254831" y="4493"/>
+                  <a:pt x="3255479" y="9472"/>
+                  <a:pt x="3255095" y="18288"/>
+                </a:cubicBezTo>
+                <a:cubicBezTo>
+                  <a:pt x="3120743" y="16690"/>
+                  <a:pt x="2759628" y="42462"/>
+                  <a:pt x="2604076" y="18288"/>
+                </a:cubicBezTo>
+                <a:cubicBezTo>
+                  <a:pt x="2448524" y="-5886"/>
+                  <a:pt x="2184336" y="19599"/>
+                  <a:pt x="1887955" y="18288"/>
+                </a:cubicBezTo>
+                <a:cubicBezTo>
+                  <a:pt x="1591574" y="16977"/>
+                  <a:pt x="1548845" y="6870"/>
+                  <a:pt x="1334589" y="18288"/>
+                </a:cubicBezTo>
+                <a:cubicBezTo>
+                  <a:pt x="1120333" y="29706"/>
+                  <a:pt x="996014" y="9662"/>
+                  <a:pt x="683570" y="18288"/>
+                </a:cubicBezTo>
+                <a:cubicBezTo>
+                  <a:pt x="371126" y="26914"/>
+                  <a:pt x="198687" y="16167"/>
+                  <a:pt x="0" y="18288"/>
+                </a:cubicBezTo>
+                <a:cubicBezTo>
+                  <a:pt x="843" y="9577"/>
+                  <a:pt x="371" y="6900"/>
+                  <a:pt x="0" y="0"/>
+                </a:cubicBezTo>
+                <a:close/>
+              </a:path>
+            </a:pathLst>
+          </a:custGeom>
+          <a:solidFill>
+            <a:schemeClr val="accent2"/>
+          </a:solidFill>
+          <a:ln w="38100" cap="rnd">
+            <a:solidFill>
+              <a:schemeClr val="accent2"/>
+            </a:solidFill>
+            <a:round/>
+            <a:extLst>
+              <a:ext uri="{C807C97D-BFC1-408E-A445-0C87EB9F89A2}">
+                <ask:lineSketchStyleProps xmlns:ask="http://schemas.microsoft.com/office/drawing/2018/sketchyshapes" sd="1219033472">
+                  <a:prstGeom prst="rect">
+                    <a:avLst/>
+                  </a:prstGeom>
+                  <ask:type>
+                    <ask:lineSketchFreehand/>
+                  </ask:type>
+                </ask:lineSketchStyleProps>
+              </a:ext>
+            </a:extLst>
+          </a:ln>
+        </p:spPr>
+        <p:style>
+          <a:lnRef idx="2">
+            <a:schemeClr val="accent1">
+              <a:shade val="50000"/>
+            </a:schemeClr>
+          </a:lnRef>
+          <a:fillRef idx="1">
+            <a:schemeClr val="accent1"/>
+          </a:fillRef>
+          <a:effectRef idx="0">
+            <a:schemeClr val="accent1"/>
+          </a:effectRef>
+          <a:fontRef idx="minor">
+            <a:schemeClr val="lt1"/>
+          </a:fontRef>
+        </p:style>
+        <p:txBody>
+          <a:bodyPr rtlCol="0" anchor="ctr"/>
+          <a:lstStyle/>
+          <a:p>
+            <a:pPr algn="ctr"/>
+            <a:endParaRPr lang="en-US"/>
+          </a:p>
+        </p:txBody>
+      </p:sp>
+      <p:sp>
+        <p:nvSpPr>
+          <p:cNvPr id="6" name="TextBox 5">
+            <a:extLst>
+              <a:ext uri="{FF2B5EF4-FFF2-40B4-BE49-F238E27FC236}">
+                <a16:creationId xmlns:a16="http://schemas.microsoft.com/office/drawing/2014/main" id="{E63C7871-199A-F648-5815-B4943840D64A}"/>
+              </a:ext>
+            </a:extLst>
+          </p:cNvPr>
+          <p:cNvSpPr txBox="1"/>
+          <p:nvPr/>
+        </p:nvSpPr>
+        <p:spPr>
+          <a:xfrm>
+            <a:off x="0" y="3019666"/>
+            <a:ext cx="4301983" cy="3410712"/>
+          </a:xfrm>
+          <a:prstGeom prst="rect">
+            <a:avLst/>
+          </a:prstGeom>
+        </p:spPr>
+        <p:txBody>
+          <a:bodyPr vert="horz" lIns="91440" tIns="45720" rIns="91440" bIns="45720" rtlCol="0" anchor="t">
+            <a:normAutofit/>
+          </a:bodyPr>
+          <a:lstStyle/>
+          <a:p>
+            <a:pPr marL="914400" lvl="1" indent="-228600" latinLnBrk="0">
+              <a:lnSpc>
+                <a:spcPct val="90000"/>
+              </a:lnSpc>
+              <a:spcAft>
+                <a:spcPts val="600"/>
+              </a:spcAft>
+              <a:buFont typeface="Arial" panose="020B0604020202020204" pitchFamily="34" charset="0"/>
+              <a:buChar char="•"/>
+            </a:pPr>
+            <a:r>
+              <a:rPr lang="ko-KR" altLang="en-US" sz="2200" dirty="0" err="1"/>
+              <a:t>다분기</a:t>
+            </a:r>
+            <a:r>
+              <a:rPr lang="en-US" altLang="ko-KR" sz="2200" dirty="0"/>
+              <a:t> </a:t>
+            </a:r>
+            <a:r>
+              <a:rPr lang="ko-KR" altLang="en-US" sz="2200" dirty="0"/>
+              <a:t>트리</a:t>
+            </a:r>
+            <a:endParaRPr lang="en-US" altLang="ko-KR" sz="2200" dirty="0"/>
+          </a:p>
+          <a:p>
+            <a:pPr marL="914400" lvl="1" indent="-228600" latinLnBrk="0">
+              <a:lnSpc>
+                <a:spcPct val="90000"/>
+              </a:lnSpc>
+              <a:spcAft>
+                <a:spcPts val="600"/>
+              </a:spcAft>
+              <a:buFont typeface="Arial" panose="020B0604020202020204" pitchFamily="34" charset="0"/>
+              <a:buChar char="•"/>
+            </a:pPr>
+            <a:r>
+              <a:rPr lang="ko-KR" altLang="en-US" sz="2200" dirty="0"/>
+              <a:t>조회의 </a:t>
+            </a:r>
+            <a:r>
+              <a:rPr lang="ko-KR" altLang="en-US" sz="2200" dirty="0" err="1"/>
+              <a:t>시간복잡도</a:t>
+            </a:r>
+            <a:r>
+              <a:rPr lang="en-US" altLang="ko-KR" sz="2200" dirty="0"/>
+              <a:t> : O(</a:t>
+            </a:r>
+            <a:r>
+              <a:rPr lang="en-US" altLang="ko-KR" sz="2200" dirty="0" err="1"/>
+              <a:t>logm</a:t>
+            </a:r>
+            <a:r>
+              <a:rPr lang="en-US" altLang="ko-KR" sz="2200" dirty="0"/>
+              <a:t> N)</a:t>
+            </a:r>
+          </a:p>
+          <a:p>
+            <a:pPr marL="914400" lvl="1" indent="-228600" latinLnBrk="0">
+              <a:lnSpc>
+                <a:spcPct val="90000"/>
+              </a:lnSpc>
+              <a:spcAft>
+                <a:spcPts val="600"/>
+              </a:spcAft>
+              <a:buFont typeface="Arial" panose="020B0604020202020204" pitchFamily="34" charset="0"/>
+              <a:buChar char="•"/>
+            </a:pPr>
+            <a:r>
+              <a:rPr lang="en-US" altLang="ko-KR" sz="2200" dirty="0"/>
+              <a:t>Leaf</a:t>
+            </a:r>
+            <a:r>
+              <a:rPr lang="ko-KR" altLang="en-US" sz="2200" dirty="0"/>
+              <a:t>노드들은 </a:t>
+            </a:r>
+            <a:r>
+              <a:rPr lang="en-US" altLang="ko-KR" sz="2200" dirty="0"/>
+              <a:t>LinkedList</a:t>
+            </a:r>
+            <a:r>
+              <a:rPr lang="ko-KR" altLang="en-US" sz="2200" dirty="0"/>
+              <a:t>로 연결</a:t>
+            </a:r>
+            <a:endParaRPr lang="en-US" altLang="ko-KR" sz="2200" dirty="0"/>
+          </a:p>
+          <a:p>
+            <a:pPr marL="914400" lvl="1" indent="-228600" latinLnBrk="0">
+              <a:lnSpc>
+                <a:spcPct val="90000"/>
+              </a:lnSpc>
+              <a:spcAft>
+                <a:spcPts val="600"/>
+              </a:spcAft>
+              <a:buFont typeface="Arial" panose="020B0604020202020204" pitchFamily="34" charset="0"/>
+              <a:buChar char="•"/>
+            </a:pPr>
+            <a:r>
+              <a:rPr lang="en-US" altLang="ko-KR" sz="2200" dirty="0"/>
+              <a:t>RDBMS </a:t>
+            </a:r>
+            <a:r>
+              <a:rPr lang="ko-KR" altLang="en-US" sz="2200" dirty="0"/>
+              <a:t>표준</a:t>
+            </a:r>
+            <a:endParaRPr lang="en-US" altLang="ko-KR" sz="2200" dirty="0"/>
+          </a:p>
+          <a:p>
+            <a:pPr marL="914400" lvl="1" indent="-228600" latinLnBrk="0">
+              <a:lnSpc>
+                <a:spcPct val="90000"/>
+              </a:lnSpc>
+              <a:spcAft>
+                <a:spcPts val="600"/>
+              </a:spcAft>
+              <a:buFont typeface="Arial" panose="020B0604020202020204" pitchFamily="34" charset="0"/>
+              <a:buChar char="•"/>
+            </a:pPr>
+            <a:endParaRPr lang="en-US" altLang="ko-KR" sz="2200" dirty="0"/>
+          </a:p>
+        </p:txBody>
+      </p:sp>
+      <p:pic>
+        <p:nvPicPr>
+          <p:cNvPr id="5" name="그림 4">
+            <a:extLst>
+              <a:ext uri="{FF2B5EF4-FFF2-40B4-BE49-F238E27FC236}">
+                <a16:creationId xmlns:a16="http://schemas.microsoft.com/office/drawing/2014/main" id="{50AACBA4-4FB4-CD5A-5AC4-7B8534D86956}"/>
+              </a:ext>
+            </a:extLst>
+          </p:cNvPr>
+          <p:cNvPicPr>
+            <a:picLocks noChangeAspect="1"/>
+          </p:cNvPicPr>
+          <p:nvPr/>
+        </p:nvPicPr>
+        <p:blipFill>
+          <a:blip r:embed="rId3"/>
+          <a:stretch>
+            <a:fillRect/>
+          </a:stretch>
+        </p:blipFill>
+        <p:spPr>
+          <a:xfrm>
+            <a:off x="4776102" y="640080"/>
+            <a:ext cx="6660108" cy="5577840"/>
+          </a:xfrm>
+          <a:prstGeom prst="rect">
+            <a:avLst/>
+          </a:prstGeom>
+        </p:spPr>
+      </p:pic>
+    </p:spTree>
+    <p:extLst>
+      <p:ext uri="{BB962C8B-B14F-4D97-AF65-F5344CB8AC3E}">
+        <p14:creationId xmlns:p14="http://schemas.microsoft.com/office/powerpoint/2010/main" val="4076016461"/>
+      </p:ext>
+    </p:extLst>
+  </p:cSld>
+  <p:clrMapOvr>
+    <a:masterClrMapping/>
+  </p:clrMapOvr>
+</p:sld>
+</file>
+
+<file path=ppt/slides/slide12.xml><?xml version="1.0" encoding="utf-8"?>
+<p:sld xmlns:a="http://schemas.openxmlformats.org/drawingml/2006/main" xmlns:r="http://schemas.openxmlformats.org/officeDocument/2006/relationships" xmlns:p="http://schemas.openxmlformats.org/presentationml/2006/main">
+  <p:cSld>
+    <p:spTree>
+      <p:nvGrpSpPr>
+        <p:cNvPr id="1" name=""/>
+        <p:cNvGrpSpPr/>
+        <p:nvPr/>
+      </p:nvGrpSpPr>
+      <p:grpSpPr>
+        <a:xfrm>
+          <a:off x="0" y="0"/>
+          <a:ext cx="0" cy="0"/>
+          <a:chOff x="0" y="0"/>
+          <a:chExt cx="0" cy="0"/>
+        </a:xfrm>
+      </p:grpSpPr>
+      <p:sp>
+        <p:nvSpPr>
+          <p:cNvPr id="2" name="제목 1">
+            <a:extLst>
+              <a:ext uri="{FF2B5EF4-FFF2-40B4-BE49-F238E27FC236}">
+                <a16:creationId xmlns:a16="http://schemas.microsoft.com/office/drawing/2014/main" id="{12F6E3D9-C2B7-45CF-A682-4F90C0445652}"/>
+              </a:ext>
+            </a:extLst>
+          </p:cNvPr>
+          <p:cNvSpPr>
+            <a:spLocks noGrp="1"/>
+          </p:cNvSpPr>
+          <p:nvPr>
+            <p:ph type="title"/>
+          </p:nvPr>
+        </p:nvSpPr>
+        <p:spPr>
+          <a:xfrm>
+            <a:off x="838200" y="120305"/>
+            <a:ext cx="10515600" cy="1325563"/>
+          </a:xfrm>
+        </p:spPr>
+        <p:txBody>
+          <a:bodyPr/>
+          <a:lstStyle/>
+          <a:p>
+            <a:pPr algn="ctr"/>
+            <a:r>
+              <a:rPr lang="en-US" altLang="ko-KR" dirty="0"/>
+              <a:t>RDBMS </a:t>
+            </a:r>
+            <a:r>
+              <a:rPr lang="ko-KR" altLang="en-US" dirty="0"/>
+              <a:t>최적화 방법</a:t>
+            </a:r>
+          </a:p>
+        </p:txBody>
+      </p:sp>
+      <p:sp>
+        <p:nvSpPr>
+          <p:cNvPr id="6" name="타원 5">
+            <a:extLst>
+              <a:ext uri="{FF2B5EF4-FFF2-40B4-BE49-F238E27FC236}">
+                <a16:creationId xmlns:a16="http://schemas.microsoft.com/office/drawing/2014/main" id="{0066E903-D203-3956-2113-87D7992D9AD9}"/>
+              </a:ext>
+            </a:extLst>
+          </p:cNvPr>
+          <p:cNvSpPr/>
+          <p:nvPr/>
+        </p:nvSpPr>
+        <p:spPr>
+          <a:xfrm>
+            <a:off x="6943337" y="1791203"/>
+            <a:ext cx="3719087" cy="1872870"/>
+          </a:xfrm>
+          <a:prstGeom prst="ellipse">
+            <a:avLst/>
+          </a:prstGeom>
+        </p:spPr>
+        <p:style>
+          <a:lnRef idx="2">
+            <a:schemeClr val="accent6"/>
+          </a:lnRef>
+          <a:fillRef idx="1">
+            <a:schemeClr val="lt1"/>
+          </a:fillRef>
+          <a:effectRef idx="0">
+            <a:schemeClr val="accent6"/>
+          </a:effectRef>
+          <a:fontRef idx="minor">
+            <a:schemeClr val="dk1"/>
+          </a:fontRef>
+        </p:style>
+        <p:txBody>
+          <a:bodyPr rtlCol="0" anchor="ctr"/>
+          <a:lstStyle/>
+          <a:p>
+            <a:pPr algn="ctr"/>
+            <a:r>
+              <a:rPr lang="ko-KR" altLang="en-US" sz="2400" dirty="0" err="1"/>
+              <a:t>멀티컬럼</a:t>
+            </a:r>
+            <a:r>
+              <a:rPr lang="ko-KR" altLang="en-US" sz="2400" dirty="0"/>
+              <a:t> 인덱스</a:t>
+            </a:r>
+          </a:p>
+        </p:txBody>
+      </p:sp>
+      <p:sp>
+        <p:nvSpPr>
+          <p:cNvPr id="7" name="타원 6">
+            <a:extLst>
+              <a:ext uri="{FF2B5EF4-FFF2-40B4-BE49-F238E27FC236}">
+                <a16:creationId xmlns:a16="http://schemas.microsoft.com/office/drawing/2014/main" id="{8A1E0250-C037-4070-1A2E-D7921E89B56D}"/>
+              </a:ext>
+            </a:extLst>
+          </p:cNvPr>
+          <p:cNvSpPr/>
+          <p:nvPr/>
+        </p:nvSpPr>
+        <p:spPr>
+          <a:xfrm>
+            <a:off x="1501153" y="4260302"/>
+            <a:ext cx="3719087" cy="1872870"/>
+          </a:xfrm>
+          <a:prstGeom prst="ellipse">
+            <a:avLst/>
+          </a:prstGeom>
+        </p:spPr>
+        <p:style>
+          <a:lnRef idx="2">
+            <a:schemeClr val="accent6"/>
+          </a:lnRef>
+          <a:fillRef idx="1">
+            <a:schemeClr val="lt1"/>
+          </a:fillRef>
+          <a:effectRef idx="0">
+            <a:schemeClr val="accent6"/>
+          </a:effectRef>
+          <a:fontRef idx="minor">
+            <a:schemeClr val="dk1"/>
+          </a:fontRef>
+        </p:style>
+        <p:txBody>
+          <a:bodyPr rtlCol="0" anchor="ctr"/>
+          <a:lstStyle/>
+          <a:p>
+            <a:pPr algn="ctr"/>
+            <a:r>
+              <a:rPr lang="ko-KR" altLang="en-US" sz="2400" dirty="0"/>
+              <a:t>인덱스만 검사</a:t>
+            </a:r>
+          </a:p>
+        </p:txBody>
+      </p:sp>
+      <p:sp>
+        <p:nvSpPr>
+          <p:cNvPr id="8" name="타원 7">
+            <a:extLst>
+              <a:ext uri="{FF2B5EF4-FFF2-40B4-BE49-F238E27FC236}">
+                <a16:creationId xmlns:a16="http://schemas.microsoft.com/office/drawing/2014/main" id="{F868228A-CBBA-FF83-465B-D8C56762970A}"/>
+              </a:ext>
+            </a:extLst>
+          </p:cNvPr>
+          <p:cNvSpPr/>
+          <p:nvPr/>
+        </p:nvSpPr>
+        <p:spPr>
+          <a:xfrm>
+            <a:off x="6943337" y="4260301"/>
+            <a:ext cx="3719087" cy="1872870"/>
+          </a:xfrm>
+          <a:prstGeom prst="ellipse">
+            <a:avLst/>
+          </a:prstGeom>
+        </p:spPr>
+        <p:style>
+          <a:lnRef idx="2">
+            <a:schemeClr val="accent6"/>
+          </a:lnRef>
+          <a:fillRef idx="1">
+            <a:schemeClr val="lt1"/>
+          </a:fillRef>
+          <a:effectRef idx="0">
+            <a:schemeClr val="accent6"/>
+          </a:effectRef>
+          <a:fontRef idx="minor">
+            <a:schemeClr val="dk1"/>
+          </a:fontRef>
+        </p:style>
+        <p:txBody>
+          <a:bodyPr rtlCol="0" anchor="ctr"/>
+          <a:lstStyle/>
+          <a:p>
+            <a:pPr algn="ctr"/>
+            <a:r>
+              <a:rPr lang="ko-KR" altLang="en-US" sz="2400" dirty="0"/>
+              <a:t>인덱스 병합</a:t>
+            </a:r>
+          </a:p>
+        </p:txBody>
+      </p:sp>
+      <p:sp>
+        <p:nvSpPr>
+          <p:cNvPr id="9" name="타원 8">
+            <a:extLst>
+              <a:ext uri="{FF2B5EF4-FFF2-40B4-BE49-F238E27FC236}">
+                <a16:creationId xmlns:a16="http://schemas.microsoft.com/office/drawing/2014/main" id="{4AF90D69-67CB-EEE4-923B-115846B5332E}"/>
+              </a:ext>
+            </a:extLst>
+          </p:cNvPr>
+          <p:cNvSpPr/>
+          <p:nvPr/>
+        </p:nvSpPr>
+        <p:spPr>
+          <a:xfrm>
+            <a:off x="1501153" y="1791203"/>
+            <a:ext cx="3719087" cy="1872870"/>
+          </a:xfrm>
+          <a:prstGeom prst="ellipse">
+            <a:avLst/>
+          </a:prstGeom>
+        </p:spPr>
+        <p:style>
+          <a:lnRef idx="2">
+            <a:schemeClr val="accent6"/>
+          </a:lnRef>
+          <a:fillRef idx="1">
+            <a:schemeClr val="lt1"/>
+          </a:fillRef>
+          <a:effectRef idx="0">
+            <a:schemeClr val="accent6"/>
+          </a:effectRef>
+          <a:fontRef idx="minor">
+            <a:schemeClr val="dk1"/>
+          </a:fontRef>
+        </p:style>
+        <p:txBody>
+          <a:bodyPr rtlCol="0" anchor="ctr"/>
+          <a:lstStyle/>
+          <a:p>
+            <a:pPr algn="ctr"/>
+            <a:r>
+              <a:rPr lang="ko-KR" altLang="en-US" sz="2400" dirty="0"/>
+              <a:t>고유성 보장</a:t>
+            </a:r>
+          </a:p>
+        </p:txBody>
+      </p:sp>
+    </p:spTree>
+    <p:extLst>
+      <p:ext uri="{BB962C8B-B14F-4D97-AF65-F5344CB8AC3E}">
+        <p14:creationId xmlns:p14="http://schemas.microsoft.com/office/powerpoint/2010/main" val="1884610029"/>
+      </p:ext>
+    </p:extLst>
+  </p:cSld>
+  <p:clrMapOvr>
+    <a:masterClrMapping/>
+  </p:clrMapOvr>
+</p:sld>
+</file>
+
 <file path=ppt/slides/slide2.xml><?xml version="1.0" encoding="utf-8"?>
 <p:sld xmlns:a="http://schemas.openxmlformats.org/drawingml/2006/main" xmlns:r="http://schemas.openxmlformats.org/officeDocument/2006/relationships" xmlns:p="http://schemas.openxmlformats.org/presentationml/2006/main">
   <p:cSld>
@@ -4209,206 +5822,6 @@
           <p:cNvPr id="2" name="제목 1">
             <a:extLst>
               <a:ext uri="{FF2B5EF4-FFF2-40B4-BE49-F238E27FC236}">
-                <a16:creationId xmlns:a16="http://schemas.microsoft.com/office/drawing/2014/main" id="{6DBD5CB9-E1CE-4625-9C20-6EEF3EA89932}"/>
-              </a:ext>
-            </a:extLst>
-          </p:cNvPr>
-          <p:cNvSpPr>
-            <a:spLocks noGrp="1"/>
-          </p:cNvSpPr>
-          <p:nvPr>
-            <p:ph type="title"/>
-          </p:nvPr>
-        </p:nvSpPr>
-        <p:spPr/>
-        <p:txBody>
-          <a:bodyPr/>
-          <a:lstStyle/>
-          <a:p>
-            <a:r>
-              <a:rPr lang="ko-KR" altLang="en-US" dirty="0"/>
-              <a:t>목차</a:t>
-            </a:r>
-          </a:p>
-        </p:txBody>
-      </p:sp>
-      <p:sp>
-        <p:nvSpPr>
-          <p:cNvPr id="3" name="내용 개체 틀 2">
-            <a:extLst>
-              <a:ext uri="{FF2B5EF4-FFF2-40B4-BE49-F238E27FC236}">
-                <a16:creationId xmlns:a16="http://schemas.microsoft.com/office/drawing/2014/main" id="{EE2650D3-EC94-4671-A059-6ABE9878948E}"/>
-              </a:ext>
-            </a:extLst>
-          </p:cNvPr>
-          <p:cNvSpPr>
-            <a:spLocks noGrp="1"/>
-          </p:cNvSpPr>
-          <p:nvPr>
-            <p:ph idx="1"/>
-          </p:nvPr>
-        </p:nvSpPr>
-        <p:spPr>
-          <a:xfrm>
-            <a:off x="838200" y="1523621"/>
-            <a:ext cx="10515600" cy="4969254"/>
-          </a:xfrm>
-        </p:spPr>
-        <p:txBody>
-          <a:bodyPr>
-            <a:normAutofit lnSpcReduction="10000"/>
-          </a:bodyPr>
-          <a:lstStyle/>
-          <a:p>
-            <a:pPr marL="0" indent="0">
-              <a:buNone/>
-            </a:pPr>
-            <a:endParaRPr lang="en-US" altLang="ko-KR" dirty="0"/>
-          </a:p>
-          <a:p>
-            <a:pPr>
-              <a:buFontTx/>
-              <a:buChar char="-"/>
-            </a:pPr>
-            <a:r>
-              <a:rPr lang="en-US" altLang="ko-KR" dirty="0"/>
-              <a:t>TCP/IP Layer</a:t>
-            </a:r>
-          </a:p>
-          <a:p>
-            <a:pPr>
-              <a:buFontTx/>
-              <a:buChar char="-"/>
-            </a:pPr>
-            <a:endParaRPr lang="en-US" altLang="ko-KR" dirty="0"/>
-          </a:p>
-          <a:p>
-            <a:pPr>
-              <a:buFontTx/>
-              <a:buChar char="-"/>
-            </a:pPr>
-            <a:r>
-              <a:rPr lang="ko-KR" altLang="en-US" dirty="0"/>
-              <a:t>전송 계층의 역할</a:t>
-            </a:r>
-            <a:endParaRPr lang="en-US" altLang="ko-KR" dirty="0"/>
-          </a:p>
-          <a:p>
-            <a:pPr>
-              <a:buFontTx/>
-              <a:buChar char="-"/>
-            </a:pPr>
-            <a:endParaRPr lang="en-US" altLang="ko-KR" dirty="0"/>
-          </a:p>
-          <a:p>
-            <a:pPr>
-              <a:buFontTx/>
-              <a:buChar char="-"/>
-            </a:pPr>
-            <a:r>
-              <a:rPr lang="ko-KR" altLang="en-US" dirty="0"/>
-              <a:t>연결형 통신과 비연결형 통신</a:t>
-            </a:r>
-            <a:endParaRPr lang="en-US" altLang="ko-KR" dirty="0"/>
-          </a:p>
-          <a:p>
-            <a:pPr>
-              <a:buFontTx/>
-              <a:buChar char="-"/>
-            </a:pPr>
-            <a:endParaRPr lang="en-US" altLang="ko-KR" dirty="0"/>
-          </a:p>
-          <a:p>
-            <a:pPr>
-              <a:buFontTx/>
-              <a:buChar char="-"/>
-            </a:pPr>
-            <a:r>
-              <a:rPr lang="ko-KR" altLang="en-US" dirty="0"/>
-              <a:t>다중화</a:t>
-            </a:r>
-            <a:r>
-              <a:rPr lang="en-US" altLang="ko-KR" dirty="0"/>
-              <a:t>,</a:t>
-            </a:r>
-            <a:r>
-              <a:rPr lang="ko-KR" altLang="en-US" dirty="0"/>
-              <a:t> </a:t>
-            </a:r>
-            <a:r>
-              <a:rPr lang="ko-KR" altLang="en-US" dirty="0" err="1"/>
-              <a:t>역다중화</a:t>
-            </a:r>
-            <a:endParaRPr lang="en-US" altLang="ko-KR" dirty="0"/>
-          </a:p>
-          <a:p>
-            <a:pPr>
-              <a:buFontTx/>
-              <a:buChar char="-"/>
-            </a:pPr>
-            <a:endParaRPr lang="en-US" altLang="ko-KR" dirty="0"/>
-          </a:p>
-          <a:p>
-            <a:pPr>
-              <a:buFontTx/>
-              <a:buChar char="-"/>
-            </a:pPr>
-            <a:r>
-              <a:rPr lang="ko-KR" altLang="en-US" dirty="0" err="1"/>
-              <a:t>궁금한것</a:t>
-            </a:r>
-            <a:endParaRPr lang="en-US" altLang="ko-KR" dirty="0"/>
-          </a:p>
-          <a:p>
-            <a:pPr marL="0" indent="0">
-              <a:buNone/>
-            </a:pPr>
-            <a:endParaRPr lang="en-US" altLang="ko-KR" dirty="0"/>
-          </a:p>
-          <a:p>
-            <a:pPr>
-              <a:buFontTx/>
-              <a:buChar char="-"/>
-            </a:pPr>
-            <a:endParaRPr lang="en-US" altLang="ko-KR" dirty="0"/>
-          </a:p>
-        </p:txBody>
-      </p:sp>
-    </p:spTree>
-    <p:extLst>
-      <p:ext uri="{BB962C8B-B14F-4D97-AF65-F5344CB8AC3E}">
-        <p14:creationId xmlns:p14="http://schemas.microsoft.com/office/powerpoint/2010/main" val="125972970"/>
-      </p:ext>
-    </p:extLst>
-  </p:cSld>
-  <p:clrMapOvr>
-    <a:masterClrMapping/>
-  </p:clrMapOvr>
-</p:sld>
-</file>
-
-<file path=ppt/slides/slide3.xml><?xml version="1.0" encoding="utf-8"?>
-<p:sld xmlns:a="http://schemas.openxmlformats.org/drawingml/2006/main" xmlns:r="http://schemas.openxmlformats.org/officeDocument/2006/relationships" xmlns:p="http://schemas.openxmlformats.org/presentationml/2006/main">
-  <p:cSld>
-    <p:spTree>
-      <p:nvGrpSpPr>
-        <p:cNvPr id="1" name=""/>
-        <p:cNvGrpSpPr/>
-        <p:nvPr/>
-      </p:nvGrpSpPr>
-      <p:grpSpPr>
-        <a:xfrm>
-          <a:off x="0" y="0"/>
-          <a:ext cx="0" cy="0"/>
-          <a:chOff x="0" y="0"/>
-          <a:chExt cx="0" cy="0"/>
-        </a:xfrm>
-      </p:grpSpPr>
-      <p:sp>
-        <p:nvSpPr>
-          <p:cNvPr id="2" name="제목 1">
-            <a:extLst>
-              <a:ext uri="{FF2B5EF4-FFF2-40B4-BE49-F238E27FC236}">
                 <a16:creationId xmlns:a16="http://schemas.microsoft.com/office/drawing/2014/main" id="{12F6E3D9-C2B7-45CF-A682-4F90C0445652}"/>
               </a:ext>
             </a:extLst>
@@ -4709,7 +6122,7 @@
 </p:sld>
 </file>
 
-<file path=ppt/slides/slide4.xml><?xml version="1.0" encoding="utf-8"?>
+<file path=ppt/slides/slide3.xml><?xml version="1.0" encoding="utf-8"?>
 <p:sld xmlns:a="http://schemas.openxmlformats.org/drawingml/2006/main" xmlns:r="http://schemas.openxmlformats.org/officeDocument/2006/relationships" xmlns:p="http://schemas.openxmlformats.org/presentationml/2006/main">
   <p:cSld>
     <p:spTree>
@@ -4803,7 +6216,7 @@
 </p:sld>
 </file>
 
-<file path=ppt/slides/slide5.xml><?xml version="1.0" encoding="utf-8"?>
+<file path=ppt/slides/slide4.xml><?xml version="1.0" encoding="utf-8"?>
 <p:sld xmlns:a="http://schemas.openxmlformats.org/drawingml/2006/main" xmlns:r="http://schemas.openxmlformats.org/officeDocument/2006/relationships" xmlns:p="http://schemas.openxmlformats.org/presentationml/2006/main">
   <p:cSld>
     <p:spTree>
@@ -4903,7 +6316,7 @@
 </p:sld>
 </file>
 
-<file path=ppt/slides/slide6.xml><?xml version="1.0" encoding="utf-8"?>
+<file path=ppt/slides/slide5.xml><?xml version="1.0" encoding="utf-8"?>
 <p:sld xmlns:a="http://schemas.openxmlformats.org/drawingml/2006/main" xmlns:r="http://schemas.openxmlformats.org/officeDocument/2006/relationships" xmlns:p="http://schemas.openxmlformats.org/presentationml/2006/main">
   <p:cSld>
     <p:spTree>
@@ -4997,7 +6410,7 @@
 </p:sld>
 </file>
 
-<file path=ppt/slides/slide7.xml><?xml version="1.0" encoding="utf-8"?>
+<file path=ppt/slides/slide6.xml><?xml version="1.0" encoding="utf-8"?>
 <p:sld xmlns:a="http://schemas.openxmlformats.org/drawingml/2006/main" xmlns:r="http://schemas.openxmlformats.org/officeDocument/2006/relationships" xmlns:p="http://schemas.openxmlformats.org/presentationml/2006/main">
   <p:cSld>
     <p:spTree>
@@ -5122,10 +6535,1013 @@
           </a:p>
         </p:txBody>
       </p:sp>
+      <p:sp>
+        <p:nvSpPr>
+          <p:cNvPr id="3" name="타원 2">
+            <a:extLst>
+              <a:ext uri="{FF2B5EF4-FFF2-40B4-BE49-F238E27FC236}">
+                <a16:creationId xmlns:a16="http://schemas.microsoft.com/office/drawing/2014/main" id="{7E61969B-8938-B6D0-496F-217ED158D7ED}"/>
+              </a:ext>
+            </a:extLst>
+          </p:cNvPr>
+          <p:cNvSpPr/>
+          <p:nvPr/>
+        </p:nvSpPr>
+        <p:spPr>
+          <a:xfrm>
+            <a:off x="8948455" y="3429000"/>
+            <a:ext cx="2602314" cy="1325563"/>
+          </a:xfrm>
+          <a:prstGeom prst="ellipse">
+            <a:avLst/>
+          </a:prstGeom>
+        </p:spPr>
+        <p:style>
+          <a:lnRef idx="2">
+            <a:schemeClr val="accent6"/>
+          </a:lnRef>
+          <a:fillRef idx="1">
+            <a:schemeClr val="lt1"/>
+          </a:fillRef>
+          <a:effectRef idx="0">
+            <a:schemeClr val="accent6"/>
+          </a:effectRef>
+          <a:fontRef idx="minor">
+            <a:schemeClr val="dk1"/>
+          </a:fontRef>
+        </p:style>
+        <p:txBody>
+          <a:bodyPr rtlCol="0" anchor="ctr"/>
+          <a:lstStyle/>
+          <a:p>
+            <a:pPr algn="ctr"/>
+            <a:r>
+              <a:rPr lang="ko-KR" altLang="en-US" dirty="0"/>
+              <a:t>책의 색인</a:t>
+            </a:r>
+          </a:p>
+        </p:txBody>
+      </p:sp>
     </p:spTree>
     <p:extLst>
       <p:ext uri="{BB962C8B-B14F-4D97-AF65-F5344CB8AC3E}">
         <p14:creationId xmlns:p14="http://schemas.microsoft.com/office/powerpoint/2010/main" val="2221207063"/>
+      </p:ext>
+    </p:extLst>
+  </p:cSld>
+  <p:clrMapOvr>
+    <a:masterClrMapping/>
+  </p:clrMapOvr>
+  <p:timing>
+    <p:tnLst>
+      <p:par>
+        <p:cTn id="1" dur="indefinite" restart="never" nodeType="tmRoot">
+          <p:childTnLst>
+            <p:seq concurrent="1" nextAc="seek">
+              <p:cTn id="2" dur="indefinite" nodeType="mainSeq">
+                <p:childTnLst>
+                  <p:par>
+                    <p:cTn id="3" fill="hold">
+                      <p:stCondLst>
+                        <p:cond delay="indefinite"/>
+                      </p:stCondLst>
+                      <p:childTnLst>
+                        <p:par>
+                          <p:cTn id="4" fill="hold">
+                            <p:stCondLst>
+                              <p:cond delay="0"/>
+                            </p:stCondLst>
+                            <p:childTnLst>
+                              <p:par>
+                                <p:cTn id="5" presetID="1" presetClass="entr" presetSubtype="0" fill="hold" grpId="0" nodeType="clickEffect">
+                                  <p:stCondLst>
+                                    <p:cond delay="0"/>
+                                  </p:stCondLst>
+                                  <p:childTnLst>
+                                    <p:set>
+                                      <p:cBhvr>
+                                        <p:cTn id="6" dur="1" fill="hold">
+                                          <p:stCondLst>
+                                            <p:cond delay="0"/>
+                                          </p:stCondLst>
+                                        </p:cTn>
+                                        <p:tgtEl>
+                                          <p:spTgt spid="3"/>
+                                        </p:tgtEl>
+                                        <p:attrNameLst>
+                                          <p:attrName>style.visibility</p:attrName>
+                                        </p:attrNameLst>
+                                      </p:cBhvr>
+                                      <p:to>
+                                        <p:strVal val="visible"/>
+                                      </p:to>
+                                    </p:set>
+                                  </p:childTnLst>
+                                </p:cTn>
+                              </p:par>
+                            </p:childTnLst>
+                          </p:cTn>
+                        </p:par>
+                      </p:childTnLst>
+                    </p:cTn>
+                  </p:par>
+                </p:childTnLst>
+              </p:cTn>
+              <p:prevCondLst>
+                <p:cond evt="onPrev" delay="0">
+                  <p:tgtEl>
+                    <p:sldTgt/>
+                  </p:tgtEl>
+                </p:cond>
+              </p:prevCondLst>
+              <p:nextCondLst>
+                <p:cond evt="onNext" delay="0">
+                  <p:tgtEl>
+                    <p:sldTgt/>
+                  </p:tgtEl>
+                </p:cond>
+              </p:nextCondLst>
+            </p:seq>
+          </p:childTnLst>
+        </p:cTn>
+      </p:par>
+    </p:tnLst>
+    <p:bldLst>
+      <p:bldP spid="3" grpId="0" animBg="1"/>
+    </p:bldLst>
+  </p:timing>
+</p:sld>
+</file>
+
+<file path=ppt/slides/slide7.xml><?xml version="1.0" encoding="utf-8"?>
+<p:sld xmlns:a="http://schemas.openxmlformats.org/drawingml/2006/main" xmlns:r="http://schemas.openxmlformats.org/officeDocument/2006/relationships" xmlns:p="http://schemas.openxmlformats.org/presentationml/2006/main">
+  <p:cSld>
+    <p:spTree>
+      <p:nvGrpSpPr>
+        <p:cNvPr id="1" name=""/>
+        <p:cNvGrpSpPr/>
+        <p:nvPr/>
+      </p:nvGrpSpPr>
+      <p:grpSpPr>
+        <a:xfrm>
+          <a:off x="0" y="0"/>
+          <a:ext cx="0" cy="0"/>
+          <a:chOff x="0" y="0"/>
+          <a:chExt cx="0" cy="0"/>
+        </a:xfrm>
+      </p:grpSpPr>
+      <p:sp>
+        <p:nvSpPr>
+          <p:cNvPr id="2" name="제목 1">
+            <a:extLst>
+              <a:ext uri="{FF2B5EF4-FFF2-40B4-BE49-F238E27FC236}">
+                <a16:creationId xmlns:a16="http://schemas.microsoft.com/office/drawing/2014/main" id="{12F6E3D9-C2B7-45CF-A682-4F90C0445652}"/>
+              </a:ext>
+            </a:extLst>
+          </p:cNvPr>
+          <p:cNvSpPr>
+            <a:spLocks noGrp="1"/>
+          </p:cNvSpPr>
+          <p:nvPr>
+            <p:ph type="title"/>
+          </p:nvPr>
+        </p:nvSpPr>
+        <p:spPr>
+          <a:xfrm>
+            <a:off x="838200" y="120305"/>
+            <a:ext cx="10515600" cy="1325563"/>
+          </a:xfrm>
+        </p:spPr>
+        <p:txBody>
+          <a:bodyPr/>
+          <a:lstStyle/>
+          <a:p>
+            <a:pPr algn="ctr"/>
+            <a:r>
+              <a:rPr lang="ko-KR" altLang="en-US" dirty="0"/>
+              <a:t>인덱스 관리</a:t>
+            </a:r>
+          </a:p>
+        </p:txBody>
+      </p:sp>
+      <p:sp>
+        <p:nvSpPr>
+          <p:cNvPr id="5" name="TextBox 4">
+            <a:extLst>
+              <a:ext uri="{FF2B5EF4-FFF2-40B4-BE49-F238E27FC236}">
+                <a16:creationId xmlns:a16="http://schemas.microsoft.com/office/drawing/2014/main" id="{263D0DB2-5A67-C906-D50F-8CECD88CB9B2}"/>
+              </a:ext>
+            </a:extLst>
+          </p:cNvPr>
+          <p:cNvSpPr txBox="1"/>
+          <p:nvPr/>
+        </p:nvSpPr>
+        <p:spPr>
+          <a:xfrm>
+            <a:off x="1616015" y="1783545"/>
+            <a:ext cx="9264769" cy="954107"/>
+          </a:xfrm>
+          <a:prstGeom prst="rect">
+            <a:avLst/>
+          </a:prstGeom>
+          <a:noFill/>
+        </p:spPr>
+        <p:txBody>
+          <a:bodyPr wrap="square" rtlCol="0">
+            <a:spAutoFit/>
+          </a:bodyPr>
+          <a:lstStyle/>
+          <a:p>
+            <a:r>
+              <a:rPr lang="en-US" altLang="ko-KR" sz="2800" dirty="0"/>
+              <a:t>DBMS</a:t>
+            </a:r>
+            <a:r>
+              <a:rPr lang="ko-KR" altLang="en-US" sz="2800" dirty="0"/>
+              <a:t>는 인덱스를 항상 최신의 정렬된 상태로 유지해야 원하는 값을 빠르게 탐색할 수 있다</a:t>
+            </a:r>
+            <a:r>
+              <a:rPr lang="en-US" altLang="ko-KR" sz="2800" dirty="0"/>
+              <a:t>.</a:t>
+            </a:r>
+          </a:p>
+        </p:txBody>
+      </p:sp>
+      <p:sp>
+        <p:nvSpPr>
+          <p:cNvPr id="6" name="타원 5">
+            <a:extLst>
+              <a:ext uri="{FF2B5EF4-FFF2-40B4-BE49-F238E27FC236}">
+                <a16:creationId xmlns:a16="http://schemas.microsoft.com/office/drawing/2014/main" id="{0066E903-D203-3956-2113-87D7992D9AD9}"/>
+              </a:ext>
+            </a:extLst>
+          </p:cNvPr>
+          <p:cNvSpPr/>
+          <p:nvPr/>
+        </p:nvSpPr>
+        <p:spPr>
+          <a:xfrm>
+            <a:off x="838200" y="3874815"/>
+            <a:ext cx="2602314" cy="1325563"/>
+          </a:xfrm>
+          <a:prstGeom prst="ellipse">
+            <a:avLst/>
+          </a:prstGeom>
+        </p:spPr>
+        <p:style>
+          <a:lnRef idx="2">
+            <a:schemeClr val="accent6"/>
+          </a:lnRef>
+          <a:fillRef idx="1">
+            <a:schemeClr val="lt1"/>
+          </a:fillRef>
+          <a:effectRef idx="0">
+            <a:schemeClr val="accent6"/>
+          </a:effectRef>
+          <a:fontRef idx="minor">
+            <a:schemeClr val="dk1"/>
+          </a:fontRef>
+        </p:style>
+        <p:txBody>
+          <a:bodyPr rtlCol="0" anchor="ctr"/>
+          <a:lstStyle/>
+          <a:p>
+            <a:pPr algn="ctr"/>
+            <a:r>
+              <a:rPr lang="en-US" altLang="ko-KR" dirty="0"/>
+              <a:t>INSERT</a:t>
+            </a:r>
+            <a:endParaRPr lang="ko-KR" altLang="en-US" dirty="0"/>
+          </a:p>
+        </p:txBody>
+      </p:sp>
+      <p:sp>
+        <p:nvSpPr>
+          <p:cNvPr id="7" name="타원 6">
+            <a:extLst>
+              <a:ext uri="{FF2B5EF4-FFF2-40B4-BE49-F238E27FC236}">
+                <a16:creationId xmlns:a16="http://schemas.microsoft.com/office/drawing/2014/main" id="{8A1E0250-C037-4070-1A2E-D7921E89B56D}"/>
+              </a:ext>
+            </a:extLst>
+          </p:cNvPr>
+          <p:cNvSpPr/>
+          <p:nvPr/>
+        </p:nvSpPr>
+        <p:spPr>
+          <a:xfrm>
+            <a:off x="4794843" y="3874816"/>
+            <a:ext cx="2602314" cy="1325563"/>
+          </a:xfrm>
+          <a:prstGeom prst="ellipse">
+            <a:avLst/>
+          </a:prstGeom>
+        </p:spPr>
+        <p:style>
+          <a:lnRef idx="2">
+            <a:schemeClr val="accent6"/>
+          </a:lnRef>
+          <a:fillRef idx="1">
+            <a:schemeClr val="lt1"/>
+          </a:fillRef>
+          <a:effectRef idx="0">
+            <a:schemeClr val="accent6"/>
+          </a:effectRef>
+          <a:fontRef idx="minor">
+            <a:schemeClr val="dk1"/>
+          </a:fontRef>
+        </p:style>
+        <p:txBody>
+          <a:bodyPr rtlCol="0" anchor="ctr"/>
+          <a:lstStyle/>
+          <a:p>
+            <a:pPr algn="ctr"/>
+            <a:r>
+              <a:rPr lang="en-US" altLang="ko-KR" dirty="0"/>
+              <a:t>UPDATE</a:t>
+            </a:r>
+            <a:endParaRPr lang="ko-KR" altLang="en-US" dirty="0"/>
+          </a:p>
+        </p:txBody>
+      </p:sp>
+      <p:sp>
+        <p:nvSpPr>
+          <p:cNvPr id="8" name="타원 7">
+            <a:extLst>
+              <a:ext uri="{FF2B5EF4-FFF2-40B4-BE49-F238E27FC236}">
+                <a16:creationId xmlns:a16="http://schemas.microsoft.com/office/drawing/2014/main" id="{F868228A-CBBA-FF83-465B-D8C56762970A}"/>
+              </a:ext>
+            </a:extLst>
+          </p:cNvPr>
+          <p:cNvSpPr/>
+          <p:nvPr/>
+        </p:nvSpPr>
+        <p:spPr>
+          <a:xfrm>
+            <a:off x="8751486" y="3874816"/>
+            <a:ext cx="2602314" cy="1325563"/>
+          </a:xfrm>
+          <a:prstGeom prst="ellipse">
+            <a:avLst/>
+          </a:prstGeom>
+        </p:spPr>
+        <p:style>
+          <a:lnRef idx="2">
+            <a:schemeClr val="accent6"/>
+          </a:lnRef>
+          <a:fillRef idx="1">
+            <a:schemeClr val="lt1"/>
+          </a:fillRef>
+          <a:effectRef idx="0">
+            <a:schemeClr val="accent6"/>
+          </a:effectRef>
+          <a:fontRef idx="minor">
+            <a:schemeClr val="dk1"/>
+          </a:fontRef>
+        </p:style>
+        <p:txBody>
+          <a:bodyPr rtlCol="0" anchor="ctr"/>
+          <a:lstStyle/>
+          <a:p>
+            <a:pPr algn="ctr"/>
+            <a:r>
+              <a:rPr lang="en-US" altLang="ko-KR" dirty="0"/>
+              <a:t>DELETE</a:t>
+            </a:r>
+            <a:endParaRPr lang="ko-KR" altLang="en-US" dirty="0"/>
+          </a:p>
+        </p:txBody>
+      </p:sp>
+    </p:spTree>
+    <p:extLst>
+      <p:ext uri="{BB962C8B-B14F-4D97-AF65-F5344CB8AC3E}">
+        <p14:creationId xmlns:p14="http://schemas.microsoft.com/office/powerpoint/2010/main" val="1885747340"/>
+      </p:ext>
+    </p:extLst>
+  </p:cSld>
+  <p:clrMapOvr>
+    <a:masterClrMapping/>
+  </p:clrMapOvr>
+  <p:timing>
+    <p:tnLst>
+      <p:par>
+        <p:cTn id="1" dur="indefinite" restart="never" nodeType="tmRoot">
+          <p:childTnLst>
+            <p:seq concurrent="1" nextAc="seek">
+              <p:cTn id="2" dur="indefinite" nodeType="mainSeq">
+                <p:childTnLst>
+                  <p:par>
+                    <p:cTn id="3" fill="hold">
+                      <p:stCondLst>
+                        <p:cond delay="indefinite"/>
+                      </p:stCondLst>
+                      <p:childTnLst>
+                        <p:par>
+                          <p:cTn id="4" fill="hold">
+                            <p:stCondLst>
+                              <p:cond delay="0"/>
+                            </p:stCondLst>
+                            <p:childTnLst>
+                              <p:par>
+                                <p:cTn id="5" presetID="1" presetClass="entr" presetSubtype="0" fill="hold" grpId="0" nodeType="clickEffect">
+                                  <p:stCondLst>
+                                    <p:cond delay="0"/>
+                                  </p:stCondLst>
+                                  <p:childTnLst>
+                                    <p:set>
+                                      <p:cBhvr>
+                                        <p:cTn id="6" dur="1" fill="hold">
+                                          <p:stCondLst>
+                                            <p:cond delay="0"/>
+                                          </p:stCondLst>
+                                        </p:cTn>
+                                        <p:tgtEl>
+                                          <p:spTgt spid="6"/>
+                                        </p:tgtEl>
+                                        <p:attrNameLst>
+                                          <p:attrName>style.visibility</p:attrName>
+                                        </p:attrNameLst>
+                                      </p:cBhvr>
+                                      <p:to>
+                                        <p:strVal val="visible"/>
+                                      </p:to>
+                                    </p:set>
+                                  </p:childTnLst>
+                                </p:cTn>
+                              </p:par>
+                            </p:childTnLst>
+                          </p:cTn>
+                        </p:par>
+                      </p:childTnLst>
+                    </p:cTn>
+                  </p:par>
+                  <p:par>
+                    <p:cTn id="7" fill="hold">
+                      <p:stCondLst>
+                        <p:cond delay="indefinite"/>
+                      </p:stCondLst>
+                      <p:childTnLst>
+                        <p:par>
+                          <p:cTn id="8" fill="hold">
+                            <p:stCondLst>
+                              <p:cond delay="0"/>
+                            </p:stCondLst>
+                            <p:childTnLst>
+                              <p:par>
+                                <p:cTn id="9" presetID="1" presetClass="entr" presetSubtype="0" fill="hold" grpId="0" nodeType="clickEffect">
+                                  <p:stCondLst>
+                                    <p:cond delay="0"/>
+                                  </p:stCondLst>
+                                  <p:childTnLst>
+                                    <p:set>
+                                      <p:cBhvr>
+                                        <p:cTn id="10" dur="1" fill="hold">
+                                          <p:stCondLst>
+                                            <p:cond delay="0"/>
+                                          </p:stCondLst>
+                                        </p:cTn>
+                                        <p:tgtEl>
+                                          <p:spTgt spid="7"/>
+                                        </p:tgtEl>
+                                        <p:attrNameLst>
+                                          <p:attrName>style.visibility</p:attrName>
+                                        </p:attrNameLst>
+                                      </p:cBhvr>
+                                      <p:to>
+                                        <p:strVal val="visible"/>
+                                      </p:to>
+                                    </p:set>
+                                  </p:childTnLst>
+                                </p:cTn>
+                              </p:par>
+                            </p:childTnLst>
+                          </p:cTn>
+                        </p:par>
+                      </p:childTnLst>
+                    </p:cTn>
+                  </p:par>
+                  <p:par>
+                    <p:cTn id="11" fill="hold">
+                      <p:stCondLst>
+                        <p:cond delay="indefinite"/>
+                      </p:stCondLst>
+                      <p:childTnLst>
+                        <p:par>
+                          <p:cTn id="12" fill="hold">
+                            <p:stCondLst>
+                              <p:cond delay="0"/>
+                            </p:stCondLst>
+                            <p:childTnLst>
+                              <p:par>
+                                <p:cTn id="13" presetID="1" presetClass="entr" presetSubtype="0" fill="hold" grpId="0" nodeType="clickEffect">
+                                  <p:stCondLst>
+                                    <p:cond delay="0"/>
+                                  </p:stCondLst>
+                                  <p:childTnLst>
+                                    <p:set>
+                                      <p:cBhvr>
+                                        <p:cTn id="14" dur="1" fill="hold">
+                                          <p:stCondLst>
+                                            <p:cond delay="0"/>
+                                          </p:stCondLst>
+                                        </p:cTn>
+                                        <p:tgtEl>
+                                          <p:spTgt spid="8"/>
+                                        </p:tgtEl>
+                                        <p:attrNameLst>
+                                          <p:attrName>style.visibility</p:attrName>
+                                        </p:attrNameLst>
+                                      </p:cBhvr>
+                                      <p:to>
+                                        <p:strVal val="visible"/>
+                                      </p:to>
+                                    </p:set>
+                                  </p:childTnLst>
+                                </p:cTn>
+                              </p:par>
+                            </p:childTnLst>
+                          </p:cTn>
+                        </p:par>
+                      </p:childTnLst>
+                    </p:cTn>
+                  </p:par>
+                </p:childTnLst>
+              </p:cTn>
+              <p:prevCondLst>
+                <p:cond evt="onPrev" delay="0">
+                  <p:tgtEl>
+                    <p:sldTgt/>
+                  </p:tgtEl>
+                </p:cond>
+              </p:prevCondLst>
+              <p:nextCondLst>
+                <p:cond evt="onNext" delay="0">
+                  <p:tgtEl>
+                    <p:sldTgt/>
+                  </p:tgtEl>
+                </p:cond>
+              </p:nextCondLst>
+            </p:seq>
+          </p:childTnLst>
+        </p:cTn>
+      </p:par>
+    </p:tnLst>
+    <p:bldLst>
+      <p:bldP spid="6" grpId="0" animBg="1"/>
+      <p:bldP spid="7" grpId="0" animBg="1"/>
+      <p:bldP spid="8" grpId="0" animBg="1"/>
+    </p:bldLst>
+  </p:timing>
+</p:sld>
+</file>
+
+<file path=ppt/slides/slide8.xml><?xml version="1.0" encoding="utf-8"?>
+<p:sld xmlns:a="http://schemas.openxmlformats.org/drawingml/2006/main" xmlns:r="http://schemas.openxmlformats.org/officeDocument/2006/relationships" xmlns:p="http://schemas.openxmlformats.org/presentationml/2006/main">
+  <p:cSld>
+    <p:spTree>
+      <p:nvGrpSpPr>
+        <p:cNvPr id="1" name=""/>
+        <p:cNvGrpSpPr/>
+        <p:nvPr/>
+      </p:nvGrpSpPr>
+      <p:grpSpPr>
+        <a:xfrm>
+          <a:off x="0" y="0"/>
+          <a:ext cx="0" cy="0"/>
+          <a:chOff x="0" y="0"/>
+          <a:chExt cx="0" cy="0"/>
+        </a:xfrm>
+      </p:grpSpPr>
+      <p:sp>
+        <p:nvSpPr>
+          <p:cNvPr id="2" name="제목 1">
+            <a:extLst>
+              <a:ext uri="{FF2B5EF4-FFF2-40B4-BE49-F238E27FC236}">
+                <a16:creationId xmlns:a16="http://schemas.microsoft.com/office/drawing/2014/main" id="{12F6E3D9-C2B7-45CF-A682-4F90C0445652}"/>
+              </a:ext>
+            </a:extLst>
+          </p:cNvPr>
+          <p:cNvSpPr>
+            <a:spLocks noGrp="1"/>
+          </p:cNvSpPr>
+          <p:nvPr>
+            <p:ph type="title"/>
+          </p:nvPr>
+        </p:nvSpPr>
+        <p:spPr>
+          <a:xfrm>
+            <a:off x="838200" y="120305"/>
+            <a:ext cx="10515600" cy="1325563"/>
+          </a:xfrm>
+        </p:spPr>
+        <p:txBody>
+          <a:bodyPr/>
+          <a:lstStyle/>
+          <a:p>
+            <a:pPr algn="ctr"/>
+            <a:r>
+              <a:rPr lang="en-US" altLang="ko-KR" dirty="0"/>
+              <a:t>Date Manipulation Language</a:t>
+            </a:r>
+            <a:endParaRPr lang="ko-KR" altLang="en-US" dirty="0"/>
+          </a:p>
+        </p:txBody>
+      </p:sp>
+      <p:sp>
+        <p:nvSpPr>
+          <p:cNvPr id="6" name="타원 5">
+            <a:extLst>
+              <a:ext uri="{FF2B5EF4-FFF2-40B4-BE49-F238E27FC236}">
+                <a16:creationId xmlns:a16="http://schemas.microsoft.com/office/drawing/2014/main" id="{0066E903-D203-3956-2113-87D7992D9AD9}"/>
+              </a:ext>
+            </a:extLst>
+          </p:cNvPr>
+          <p:cNvSpPr/>
+          <p:nvPr/>
+        </p:nvSpPr>
+        <p:spPr>
+          <a:xfrm>
+            <a:off x="7634713" y="2103437"/>
+            <a:ext cx="2602314" cy="1325563"/>
+          </a:xfrm>
+          <a:prstGeom prst="ellipse">
+            <a:avLst/>
+          </a:prstGeom>
+        </p:spPr>
+        <p:style>
+          <a:lnRef idx="2">
+            <a:schemeClr val="accent6"/>
+          </a:lnRef>
+          <a:fillRef idx="1">
+            <a:schemeClr val="lt1"/>
+          </a:fillRef>
+          <a:effectRef idx="0">
+            <a:schemeClr val="accent6"/>
+          </a:effectRef>
+          <a:fontRef idx="minor">
+            <a:schemeClr val="dk1"/>
+          </a:fontRef>
+        </p:style>
+        <p:txBody>
+          <a:bodyPr rtlCol="0" anchor="ctr"/>
+          <a:lstStyle/>
+          <a:p>
+            <a:pPr algn="ctr"/>
+            <a:r>
+              <a:rPr lang="en-US" altLang="ko-KR" dirty="0"/>
+              <a:t>INSERT</a:t>
+            </a:r>
+            <a:endParaRPr lang="ko-KR" altLang="en-US" dirty="0"/>
+          </a:p>
+        </p:txBody>
+      </p:sp>
+      <p:sp>
+        <p:nvSpPr>
+          <p:cNvPr id="7" name="타원 6">
+            <a:extLst>
+              <a:ext uri="{FF2B5EF4-FFF2-40B4-BE49-F238E27FC236}">
+                <a16:creationId xmlns:a16="http://schemas.microsoft.com/office/drawing/2014/main" id="{8A1E0250-C037-4070-1A2E-D7921E89B56D}"/>
+              </a:ext>
+            </a:extLst>
+          </p:cNvPr>
+          <p:cNvSpPr/>
+          <p:nvPr/>
+        </p:nvSpPr>
+        <p:spPr>
+          <a:xfrm>
+            <a:off x="2192529" y="4572536"/>
+            <a:ext cx="2602314" cy="1325563"/>
+          </a:xfrm>
+          <a:prstGeom prst="ellipse">
+            <a:avLst/>
+          </a:prstGeom>
+        </p:spPr>
+        <p:style>
+          <a:lnRef idx="2">
+            <a:schemeClr val="accent6"/>
+          </a:lnRef>
+          <a:fillRef idx="1">
+            <a:schemeClr val="lt1"/>
+          </a:fillRef>
+          <a:effectRef idx="0">
+            <a:schemeClr val="accent6"/>
+          </a:effectRef>
+          <a:fontRef idx="minor">
+            <a:schemeClr val="dk1"/>
+          </a:fontRef>
+        </p:style>
+        <p:txBody>
+          <a:bodyPr rtlCol="0" anchor="ctr"/>
+          <a:lstStyle/>
+          <a:p>
+            <a:pPr algn="ctr"/>
+            <a:r>
+              <a:rPr lang="en-US" altLang="ko-KR" dirty="0"/>
+              <a:t>UPDATE</a:t>
+            </a:r>
+            <a:endParaRPr lang="ko-KR" altLang="en-US" dirty="0"/>
+          </a:p>
+        </p:txBody>
+      </p:sp>
+      <p:sp>
+        <p:nvSpPr>
+          <p:cNvPr id="8" name="타원 7">
+            <a:extLst>
+              <a:ext uri="{FF2B5EF4-FFF2-40B4-BE49-F238E27FC236}">
+                <a16:creationId xmlns:a16="http://schemas.microsoft.com/office/drawing/2014/main" id="{F868228A-CBBA-FF83-465B-D8C56762970A}"/>
+              </a:ext>
+            </a:extLst>
+          </p:cNvPr>
+          <p:cNvSpPr/>
+          <p:nvPr/>
+        </p:nvSpPr>
+        <p:spPr>
+          <a:xfrm>
+            <a:off x="7634713" y="4572535"/>
+            <a:ext cx="2602314" cy="1325563"/>
+          </a:xfrm>
+          <a:prstGeom prst="ellipse">
+            <a:avLst/>
+          </a:prstGeom>
+        </p:spPr>
+        <p:style>
+          <a:lnRef idx="2">
+            <a:schemeClr val="accent6"/>
+          </a:lnRef>
+          <a:fillRef idx="1">
+            <a:schemeClr val="lt1"/>
+          </a:fillRef>
+          <a:effectRef idx="0">
+            <a:schemeClr val="accent6"/>
+          </a:effectRef>
+          <a:fontRef idx="minor">
+            <a:schemeClr val="dk1"/>
+          </a:fontRef>
+        </p:style>
+        <p:txBody>
+          <a:bodyPr rtlCol="0" anchor="ctr"/>
+          <a:lstStyle/>
+          <a:p>
+            <a:pPr algn="ctr"/>
+            <a:r>
+              <a:rPr lang="en-US" altLang="ko-KR" dirty="0"/>
+              <a:t>DELETE</a:t>
+            </a:r>
+            <a:endParaRPr lang="ko-KR" altLang="en-US" dirty="0"/>
+          </a:p>
+        </p:txBody>
+      </p:sp>
+      <p:sp>
+        <p:nvSpPr>
+          <p:cNvPr id="9" name="타원 8">
+            <a:extLst>
+              <a:ext uri="{FF2B5EF4-FFF2-40B4-BE49-F238E27FC236}">
+                <a16:creationId xmlns:a16="http://schemas.microsoft.com/office/drawing/2014/main" id="{4AF90D69-67CB-EEE4-923B-115846B5332E}"/>
+              </a:ext>
+            </a:extLst>
+          </p:cNvPr>
+          <p:cNvSpPr/>
+          <p:nvPr/>
+        </p:nvSpPr>
+        <p:spPr>
+          <a:xfrm>
+            <a:off x="2192529" y="2103437"/>
+            <a:ext cx="2602314" cy="1325563"/>
+          </a:xfrm>
+          <a:prstGeom prst="ellipse">
+            <a:avLst/>
+          </a:prstGeom>
+        </p:spPr>
+        <p:style>
+          <a:lnRef idx="2">
+            <a:schemeClr val="accent6"/>
+          </a:lnRef>
+          <a:fillRef idx="1">
+            <a:schemeClr val="lt1"/>
+          </a:fillRef>
+          <a:effectRef idx="0">
+            <a:schemeClr val="accent6"/>
+          </a:effectRef>
+          <a:fontRef idx="minor">
+            <a:schemeClr val="dk1"/>
+          </a:fontRef>
+        </p:style>
+        <p:txBody>
+          <a:bodyPr rtlCol="0" anchor="ctr"/>
+          <a:lstStyle/>
+          <a:p>
+            <a:pPr algn="ctr"/>
+            <a:r>
+              <a:rPr lang="en-US" altLang="ko-KR" dirty="0"/>
+              <a:t>SELECT</a:t>
+            </a:r>
+            <a:endParaRPr lang="ko-KR" altLang="en-US" dirty="0"/>
+          </a:p>
+        </p:txBody>
+      </p:sp>
+    </p:spTree>
+    <p:extLst>
+      <p:ext uri="{BB962C8B-B14F-4D97-AF65-F5344CB8AC3E}">
+        <p14:creationId xmlns:p14="http://schemas.microsoft.com/office/powerpoint/2010/main" val="553209626"/>
+      </p:ext>
+    </p:extLst>
+  </p:cSld>
+  <p:clrMapOvr>
+    <a:masterClrMapping/>
+  </p:clrMapOvr>
+</p:sld>
+</file>
+
+<file path=ppt/slides/slide9.xml><?xml version="1.0" encoding="utf-8"?>
+<p:sld xmlns:a="http://schemas.openxmlformats.org/drawingml/2006/main" xmlns:r="http://schemas.openxmlformats.org/officeDocument/2006/relationships" xmlns:p="http://schemas.openxmlformats.org/presentationml/2006/main">
+  <p:cSld>
+    <p:spTree>
+      <p:nvGrpSpPr>
+        <p:cNvPr id="1" name=""/>
+        <p:cNvGrpSpPr/>
+        <p:nvPr/>
+      </p:nvGrpSpPr>
+      <p:grpSpPr>
+        <a:xfrm>
+          <a:off x="0" y="0"/>
+          <a:ext cx="0" cy="0"/>
+          <a:chOff x="0" y="0"/>
+          <a:chExt cx="0" cy="0"/>
+        </a:xfrm>
+      </p:grpSpPr>
+      <p:sp>
+        <p:nvSpPr>
+          <p:cNvPr id="2" name="제목 1">
+            <a:extLst>
+              <a:ext uri="{FF2B5EF4-FFF2-40B4-BE49-F238E27FC236}">
+                <a16:creationId xmlns:a16="http://schemas.microsoft.com/office/drawing/2014/main" id="{12F6E3D9-C2B7-45CF-A682-4F90C0445652}"/>
+              </a:ext>
+            </a:extLst>
+          </p:cNvPr>
+          <p:cNvSpPr>
+            <a:spLocks noGrp="1"/>
+          </p:cNvSpPr>
+          <p:nvPr>
+            <p:ph type="title"/>
+          </p:nvPr>
+        </p:nvSpPr>
+        <p:spPr>
+          <a:xfrm>
+            <a:off x="838200" y="120305"/>
+            <a:ext cx="10515600" cy="1325563"/>
+          </a:xfrm>
+        </p:spPr>
+        <p:txBody>
+          <a:bodyPr/>
+          <a:lstStyle/>
+          <a:p>
+            <a:pPr algn="ctr"/>
+            <a:r>
+              <a:rPr lang="ko-KR" altLang="en-US" dirty="0"/>
+              <a:t>인덱스의 장단점</a:t>
+            </a:r>
+          </a:p>
+        </p:txBody>
+      </p:sp>
+      <p:sp>
+        <p:nvSpPr>
+          <p:cNvPr id="6" name="TextBox 5">
+            <a:extLst>
+              <a:ext uri="{FF2B5EF4-FFF2-40B4-BE49-F238E27FC236}">
+                <a16:creationId xmlns:a16="http://schemas.microsoft.com/office/drawing/2014/main" id="{E63C7871-199A-F648-5815-B4943840D64A}"/>
+              </a:ext>
+            </a:extLst>
+          </p:cNvPr>
+          <p:cNvSpPr txBox="1"/>
+          <p:nvPr/>
+        </p:nvSpPr>
+        <p:spPr>
+          <a:xfrm>
+            <a:off x="1463615" y="2126756"/>
+            <a:ext cx="9264769" cy="4401205"/>
+          </a:xfrm>
+          <a:prstGeom prst="rect">
+            <a:avLst/>
+          </a:prstGeom>
+          <a:noFill/>
+        </p:spPr>
+        <p:txBody>
+          <a:bodyPr wrap="square" rtlCol="0">
+            <a:spAutoFit/>
+          </a:bodyPr>
+          <a:lstStyle/>
+          <a:p>
+            <a:pPr marL="457200" indent="-457200">
+              <a:buFont typeface="Arial" panose="020B0604020202020204" pitchFamily="34" charset="0"/>
+              <a:buChar char="•"/>
+            </a:pPr>
+            <a:r>
+              <a:rPr lang="ko-KR" altLang="en-US" sz="2800" dirty="0"/>
+              <a:t>장점</a:t>
+            </a:r>
+            <a:endParaRPr lang="en-US" altLang="ko-KR" sz="2800" dirty="0"/>
+          </a:p>
+          <a:p>
+            <a:pPr marL="914400" lvl="1" indent="-457200">
+              <a:buFont typeface="Arial" panose="020B0604020202020204" pitchFamily="34" charset="0"/>
+              <a:buChar char="•"/>
+            </a:pPr>
+            <a:r>
+              <a:rPr lang="ko-KR" altLang="en-US" sz="2800" dirty="0"/>
+              <a:t>조회의 속도</a:t>
+            </a:r>
+            <a:r>
+              <a:rPr lang="en-US" altLang="ko-KR" sz="2800" dirty="0"/>
+              <a:t>, </a:t>
+            </a:r>
+            <a:r>
+              <a:rPr lang="ko-KR" altLang="en-US" sz="2800" dirty="0"/>
+              <a:t>성능 향상</a:t>
+            </a:r>
+            <a:endParaRPr lang="en-US" altLang="ko-KR" sz="2800" dirty="0"/>
+          </a:p>
+          <a:p>
+            <a:pPr marL="914400" lvl="1" indent="-457200">
+              <a:buFont typeface="Arial" panose="020B0604020202020204" pitchFamily="34" charset="0"/>
+              <a:buChar char="•"/>
+            </a:pPr>
+            <a:r>
+              <a:rPr lang="ko-KR" altLang="en-US" sz="2800" dirty="0"/>
+              <a:t>시스템 부하 절감</a:t>
+            </a:r>
+            <a:endParaRPr lang="en-US" altLang="ko-KR" sz="2800" dirty="0"/>
+          </a:p>
+          <a:p>
+            <a:pPr lvl="1"/>
+            <a:endParaRPr lang="en-US" altLang="ko-KR" sz="2800" dirty="0"/>
+          </a:p>
+          <a:p>
+            <a:pPr marL="457200" indent="-457200">
+              <a:buFont typeface="Arial" panose="020B0604020202020204" pitchFamily="34" charset="0"/>
+              <a:buChar char="•"/>
+            </a:pPr>
+            <a:r>
+              <a:rPr lang="ko-KR" altLang="en-US" sz="2800" dirty="0"/>
+              <a:t>단점</a:t>
+            </a:r>
+            <a:endParaRPr lang="en-US" altLang="ko-KR" sz="2800" dirty="0"/>
+          </a:p>
+          <a:p>
+            <a:pPr marL="914400" lvl="1" indent="-457200">
+              <a:buFont typeface="Arial" panose="020B0604020202020204" pitchFamily="34" charset="0"/>
+              <a:buChar char="•"/>
+            </a:pPr>
+            <a:r>
+              <a:rPr lang="ko-KR" altLang="en-US" sz="2800" dirty="0"/>
+              <a:t>인덱스 관리를 위한 저장공간 필요</a:t>
+            </a:r>
+            <a:endParaRPr lang="en-US" altLang="ko-KR" sz="2800" dirty="0"/>
+          </a:p>
+          <a:p>
+            <a:pPr marL="914400" lvl="1" indent="-457200">
+              <a:buFont typeface="Arial" panose="020B0604020202020204" pitchFamily="34" charset="0"/>
+              <a:buChar char="•"/>
+            </a:pPr>
+            <a:r>
+              <a:rPr lang="en-US" altLang="ko-KR" sz="2800" dirty="0"/>
+              <a:t>DML</a:t>
+            </a:r>
+            <a:r>
+              <a:rPr lang="ko-KR" altLang="en-US" sz="2800" dirty="0"/>
+              <a:t> 추가 작업</a:t>
+            </a:r>
+            <a:endParaRPr lang="en-US" altLang="ko-KR" sz="2800" dirty="0"/>
+          </a:p>
+          <a:p>
+            <a:pPr marL="914400" lvl="1" indent="-457200">
+              <a:buFont typeface="Arial" panose="020B0604020202020204" pitchFamily="34" charset="0"/>
+              <a:buChar char="•"/>
+            </a:pPr>
+            <a:r>
+              <a:rPr lang="ko-KR" altLang="en-US" sz="2800" dirty="0"/>
+              <a:t>잘못 사용시 성능 저하</a:t>
+            </a:r>
+            <a:endParaRPr lang="en-US" altLang="ko-KR" sz="2800" dirty="0"/>
+          </a:p>
+          <a:p>
+            <a:pPr marL="914400" lvl="1" indent="-457200">
+              <a:buFont typeface="Arial" panose="020B0604020202020204" pitchFamily="34" charset="0"/>
+              <a:buChar char="•"/>
+            </a:pPr>
+            <a:endParaRPr lang="en-US" altLang="ko-KR" sz="2800" dirty="0"/>
+          </a:p>
+          <a:p>
+            <a:pPr marL="914400" lvl="1" indent="-457200">
+              <a:buFont typeface="Arial" panose="020B0604020202020204" pitchFamily="34" charset="0"/>
+              <a:buChar char="•"/>
+            </a:pPr>
+            <a:endParaRPr lang="en-US" altLang="ko-KR" sz="2800" dirty="0"/>
+          </a:p>
+        </p:txBody>
+      </p:sp>
+    </p:spTree>
+    <p:extLst>
+      <p:ext uri="{BB962C8B-B14F-4D97-AF65-F5344CB8AC3E}">
+        <p14:creationId xmlns:p14="http://schemas.microsoft.com/office/powerpoint/2010/main" val="506437397"/>
       </p:ext>
     </p:extLst>
   </p:cSld>

</xml_diff>